<commit_message>
nop bai tap 14,15 ham
</commit_message>
<xml_diff>
--- a/ss5_html_table/Wellcom to my PowerPoint.pptx
+++ b/ss5_html_table/Wellcom to my PowerPoint.pptx
@@ -7,11 +7,14 @@
   <p:sldIdLst>
     <p:sldId id="256" r:id="rId2"/>
     <p:sldId id="257" r:id="rId3"/>
-    <p:sldId id="261" r:id="rId4"/>
-    <p:sldId id="258" r:id="rId5"/>
-    <p:sldId id="259" r:id="rId6"/>
-    <p:sldId id="260" r:id="rId7"/>
-    <p:sldId id="262" r:id="rId8"/>
+    <p:sldId id="263" r:id="rId4"/>
+    <p:sldId id="261" r:id="rId5"/>
+    <p:sldId id="264" r:id="rId6"/>
+    <p:sldId id="265" r:id="rId7"/>
+    <p:sldId id="258" r:id="rId8"/>
+    <p:sldId id="259" r:id="rId9"/>
+    <p:sldId id="260" r:id="rId10"/>
+    <p:sldId id="262" r:id="rId11"/>
   </p:sldIdLst>
   <p:sldSz cx="12192000" cy="6858000"/>
   <p:notesSz cx="6858000" cy="9144000"/>
@@ -110,6 +113,11 @@
       </a:defRPr>
     </a:lvl9pPr>
   </p:defaultTextStyle>
+  <p:extLst>
+    <p:ext uri="{EFAFB233-063F-42B5-8137-9DF3F51BA10A}">
+      <p15:sldGuideLst xmlns:p15="http://schemas.microsoft.com/office/powerpoint/2012/main"/>
+    </p:ext>
+  </p:extLst>
 </p:presentation>
 </file>
 
@@ -260,7 +268,7 @@
           <a:p>
             <a:fld id="{5C59E9F3-0CF1-4D76-9C98-9716D4C83902}" type="datetimeFigureOut">
               <a:rPr lang="en-US" smtClean="0"/>
-              <a:t>7/1/2022</a:t>
+              <a:t>7/16/2022</a:t>
             </a:fld>
             <a:endParaRPr lang="en-US"/>
           </a:p>
@@ -458,7 +466,7 @@
           <a:p>
             <a:fld id="{5C59E9F3-0CF1-4D76-9C98-9716D4C83902}" type="datetimeFigureOut">
               <a:rPr lang="en-US" smtClean="0"/>
-              <a:t>7/1/2022</a:t>
+              <a:t>7/16/2022</a:t>
             </a:fld>
             <a:endParaRPr lang="en-US"/>
           </a:p>
@@ -666,7 +674,7 @@
           <a:p>
             <a:fld id="{5C59E9F3-0CF1-4D76-9C98-9716D4C83902}" type="datetimeFigureOut">
               <a:rPr lang="en-US" smtClean="0"/>
-              <a:t>7/1/2022</a:t>
+              <a:t>7/16/2022</a:t>
             </a:fld>
             <a:endParaRPr lang="en-US"/>
           </a:p>
@@ -864,7 +872,7 @@
           <a:p>
             <a:fld id="{5C59E9F3-0CF1-4D76-9C98-9716D4C83902}" type="datetimeFigureOut">
               <a:rPr lang="en-US" smtClean="0"/>
-              <a:t>7/1/2022</a:t>
+              <a:t>7/16/2022</a:t>
             </a:fld>
             <a:endParaRPr lang="en-US"/>
           </a:p>
@@ -1139,7 +1147,7 @@
           <a:p>
             <a:fld id="{5C59E9F3-0CF1-4D76-9C98-9716D4C83902}" type="datetimeFigureOut">
               <a:rPr lang="en-US" smtClean="0"/>
-              <a:t>7/1/2022</a:t>
+              <a:t>7/16/2022</a:t>
             </a:fld>
             <a:endParaRPr lang="en-US"/>
           </a:p>
@@ -1404,7 +1412,7 @@
           <a:p>
             <a:fld id="{5C59E9F3-0CF1-4D76-9C98-9716D4C83902}" type="datetimeFigureOut">
               <a:rPr lang="en-US" smtClean="0"/>
-              <a:t>7/1/2022</a:t>
+              <a:t>7/16/2022</a:t>
             </a:fld>
             <a:endParaRPr lang="en-US"/>
           </a:p>
@@ -1816,7 +1824,7 @@
           <a:p>
             <a:fld id="{5C59E9F3-0CF1-4D76-9C98-9716D4C83902}" type="datetimeFigureOut">
               <a:rPr lang="en-US" smtClean="0"/>
-              <a:t>7/1/2022</a:t>
+              <a:t>7/16/2022</a:t>
             </a:fld>
             <a:endParaRPr lang="en-US"/>
           </a:p>
@@ -1957,7 +1965,7 @@
           <a:p>
             <a:fld id="{5C59E9F3-0CF1-4D76-9C98-9716D4C83902}" type="datetimeFigureOut">
               <a:rPr lang="en-US" smtClean="0"/>
-              <a:t>7/1/2022</a:t>
+              <a:t>7/16/2022</a:t>
             </a:fld>
             <a:endParaRPr lang="en-US"/>
           </a:p>
@@ -2070,7 +2078,7 @@
           <a:p>
             <a:fld id="{5C59E9F3-0CF1-4D76-9C98-9716D4C83902}" type="datetimeFigureOut">
               <a:rPr lang="en-US" smtClean="0"/>
-              <a:t>7/1/2022</a:t>
+              <a:t>7/16/2022</a:t>
             </a:fld>
             <a:endParaRPr lang="en-US"/>
           </a:p>
@@ -2381,7 +2389,7 @@
           <a:p>
             <a:fld id="{5C59E9F3-0CF1-4D76-9C98-9716D4C83902}" type="datetimeFigureOut">
               <a:rPr lang="en-US" smtClean="0"/>
-              <a:t>7/1/2022</a:t>
+              <a:t>7/16/2022</a:t>
             </a:fld>
             <a:endParaRPr lang="en-US"/>
           </a:p>
@@ -2669,7 +2677,7 @@
           <a:p>
             <a:fld id="{5C59E9F3-0CF1-4D76-9C98-9716D4C83902}" type="datetimeFigureOut">
               <a:rPr lang="en-US" smtClean="0"/>
-              <a:t>7/1/2022</a:t>
+              <a:t>7/16/2022</a:t>
             </a:fld>
             <a:endParaRPr lang="en-US"/>
           </a:p>
@@ -2910,7 +2918,7 @@
           <a:p>
             <a:fld id="{5C59E9F3-0CF1-4D76-9C98-9716D4C83902}" type="datetimeFigureOut">
               <a:rPr lang="en-US" smtClean="0"/>
-              <a:t>7/1/2022</a:t>
+              <a:t>7/16/2022</a:t>
             </a:fld>
             <a:endParaRPr lang="en-US"/>
           </a:p>
@@ -3663,6 +3671,448 @@
 </p:sld>
 </file>
 
+<file path=ppt/slides/slide10.xml><?xml version="1.0" encoding="utf-8"?>
+<p:sld xmlns:a="http://schemas.openxmlformats.org/drawingml/2006/main" xmlns:r="http://schemas.openxmlformats.org/officeDocument/2006/relationships" xmlns:p="http://schemas.openxmlformats.org/presentationml/2006/main">
+  <p:cSld>
+    <p:spTree>
+      <p:nvGrpSpPr>
+        <p:cNvPr id="1" name=""/>
+        <p:cNvGrpSpPr/>
+        <p:nvPr/>
+      </p:nvGrpSpPr>
+      <p:grpSpPr>
+        <a:xfrm>
+          <a:off x="0" y="0"/>
+          <a:ext cx="0" cy="0"/>
+          <a:chOff x="0" y="0"/>
+          <a:chExt cx="0" cy="0"/>
+        </a:xfrm>
+      </p:grpSpPr>
+      <p:sp>
+        <p:nvSpPr>
+          <p:cNvPr id="2" name="Title 1">
+            <a:extLst>
+              <a:ext uri="{FF2B5EF4-FFF2-40B4-BE49-F238E27FC236}">
+                <a16:creationId xmlns:a16="http://schemas.microsoft.com/office/drawing/2014/main" id="{77D7518B-6CBF-4377-A9B8-906CF2D05231}"/>
+              </a:ext>
+            </a:extLst>
+          </p:cNvPr>
+          <p:cNvSpPr>
+            <a:spLocks noGrp="1"/>
+          </p:cNvSpPr>
+          <p:nvPr>
+            <p:ph type="title"/>
+          </p:nvPr>
+        </p:nvSpPr>
+        <p:spPr/>
+        <p:txBody>
+          <a:bodyPr>
+            <a:normAutofit fontScale="90000"/>
+          </a:bodyPr>
+          <a:lstStyle/>
+          <a:p>
+            <a:pPr algn="ctr"/>
+            <a:r>
+              <a:rPr lang="en-US" dirty="0" err="1"/>
+              <a:t>Cảm</a:t>
+            </a:r>
+            <a:r>
+              <a:rPr lang="en-US" dirty="0"/>
+              <a:t> </a:t>
+            </a:r>
+            <a:r>
+              <a:rPr lang="vi-VN" dirty="0"/>
+              <a:t>ơ</a:t>
+            </a:r>
+            <a:r>
+              <a:rPr lang="en-US" dirty="0"/>
+              <a:t>n </a:t>
+            </a:r>
+            <a:r>
+              <a:rPr lang="en-US" dirty="0" err="1"/>
+              <a:t>thầy</a:t>
+            </a:r>
+            <a:r>
+              <a:rPr lang="en-US" dirty="0"/>
+              <a:t>/</a:t>
+            </a:r>
+            <a:r>
+              <a:rPr lang="en-US" dirty="0" err="1"/>
+              <a:t>anh</a:t>
+            </a:r>
+            <a:r>
+              <a:rPr lang="en-US" dirty="0"/>
+              <a:t>/</a:t>
+            </a:r>
+            <a:r>
+              <a:rPr lang="en-US" dirty="0" err="1"/>
+              <a:t>chị</a:t>
+            </a:r>
+            <a:r>
+              <a:rPr lang="en-US" dirty="0"/>
+              <a:t>/</a:t>
+            </a:r>
+            <a:r>
+              <a:rPr lang="en-US" dirty="0" err="1"/>
+              <a:t>em</a:t>
+            </a:r>
+            <a:r>
+              <a:rPr lang="en-US" dirty="0"/>
+              <a:t>/</a:t>
+            </a:r>
+            <a:r>
+              <a:rPr lang="en-US" dirty="0" err="1"/>
+              <a:t>bạn</a:t>
+            </a:r>
+            <a:r>
+              <a:rPr lang="en-US" dirty="0"/>
+              <a:t> </a:t>
+            </a:r>
+            <a:r>
+              <a:rPr lang="en-US" dirty="0" err="1"/>
+              <a:t>đã</a:t>
+            </a:r>
+            <a:r>
+              <a:rPr lang="en-US" dirty="0"/>
+              <a:t> </a:t>
+            </a:r>
+            <a:r>
+              <a:rPr lang="en-US" dirty="0" err="1"/>
+              <a:t>có</a:t>
+            </a:r>
+            <a:r>
+              <a:rPr lang="en-US" dirty="0"/>
+              <a:t> </a:t>
+            </a:r>
+            <a:r>
+              <a:rPr lang="en-US" dirty="0" err="1"/>
+              <a:t>mặt</a:t>
+            </a:r>
+            <a:r>
+              <a:rPr lang="en-US" dirty="0"/>
+              <a:t> </a:t>
+            </a:r>
+            <a:r>
+              <a:rPr lang="en-US" dirty="0" err="1"/>
+              <a:t>và</a:t>
+            </a:r>
+            <a:r>
+              <a:rPr lang="en-US" dirty="0"/>
+              <a:t> </a:t>
+            </a:r>
+            <a:r>
+              <a:rPr lang="en-US" dirty="0" err="1"/>
+              <a:t>lắng</a:t>
+            </a:r>
+            <a:r>
+              <a:rPr lang="en-US" dirty="0"/>
+              <a:t> </a:t>
+            </a:r>
+            <a:r>
+              <a:rPr lang="en-US" dirty="0" err="1"/>
+              <a:t>nge</a:t>
+            </a:r>
+            <a:r>
+              <a:rPr lang="en-US" dirty="0"/>
+              <a:t> </a:t>
+            </a:r>
+            <a:r>
+              <a:rPr lang="en-US" dirty="0" err="1"/>
+              <a:t>buổi</a:t>
+            </a:r>
+            <a:r>
+              <a:rPr lang="en-US" dirty="0"/>
+              <a:t> </a:t>
+            </a:r>
+            <a:r>
+              <a:rPr lang="en-US" dirty="0" err="1"/>
+              <a:t>thuyết</a:t>
+            </a:r>
+            <a:r>
+              <a:rPr lang="en-US" dirty="0"/>
+              <a:t> </a:t>
+            </a:r>
+            <a:r>
+              <a:rPr lang="en-US" dirty="0" err="1"/>
+              <a:t>trình</a:t>
+            </a:r>
+            <a:r>
+              <a:rPr lang="en-US" dirty="0"/>
+              <a:t> !</a:t>
+            </a:r>
+            <a:br>
+              <a:rPr lang="en-US" dirty="0"/>
+            </a:br>
+            <a:endParaRPr lang="en-US" dirty="0"/>
+          </a:p>
+        </p:txBody>
+      </p:sp>
+      <p:pic>
+        <p:nvPicPr>
+          <p:cNvPr id="5" name="Content Placeholder 4">
+            <a:extLst>
+              <a:ext uri="{FF2B5EF4-FFF2-40B4-BE49-F238E27FC236}">
+                <a16:creationId xmlns:a16="http://schemas.microsoft.com/office/drawing/2014/main" id="{6BC55331-E964-4B96-928A-5CA2B4F4B5E0}"/>
+              </a:ext>
+            </a:extLst>
+          </p:cNvPr>
+          <p:cNvPicPr>
+            <a:picLocks noGrp="1" noChangeAspect="1"/>
+          </p:cNvPicPr>
+          <p:nvPr>
+            <p:ph idx="1"/>
+          </p:nvPr>
+        </p:nvPicPr>
+        <p:blipFill>
+          <a:blip r:embed="rId2">
+            <a:extLst>
+              <a:ext uri="{28A0092B-C50C-407E-A947-70E740481C1C}">
+                <a14:useLocalDpi xmlns:a14="http://schemas.microsoft.com/office/drawing/2010/main" val="0"/>
+              </a:ext>
+            </a:extLst>
+          </a:blip>
+          <a:stretch>
+            <a:fillRect/>
+          </a:stretch>
+        </p:blipFill>
+        <p:spPr>
+          <a:xfrm>
+            <a:off x="381741" y="1340528"/>
+            <a:ext cx="10972060" cy="4836435"/>
+          </a:xfrm>
+          <a:effectLst>
+            <a:softEdge rad="317500"/>
+          </a:effectLst>
+        </p:spPr>
+      </p:pic>
+    </p:spTree>
+    <p:extLst>
+      <p:ext uri="{BB962C8B-B14F-4D97-AF65-F5344CB8AC3E}">
+        <p14:creationId xmlns:p14="http://schemas.microsoft.com/office/powerpoint/2010/main" val="3219712349"/>
+      </p:ext>
+    </p:extLst>
+  </p:cSld>
+  <p:clrMapOvr>
+    <a:masterClrMapping/>
+  </p:clrMapOvr>
+  <p:timing>
+    <p:tnLst>
+      <p:par>
+        <p:cTn id="1" dur="indefinite" restart="never" nodeType="tmRoot">
+          <p:childTnLst>
+            <p:seq concurrent="1" nextAc="seek">
+              <p:cTn id="2" dur="indefinite" nodeType="mainSeq">
+                <p:childTnLst>
+                  <p:par>
+                    <p:cTn id="3" fill="hold">
+                      <p:stCondLst>
+                        <p:cond delay="indefinite"/>
+                      </p:stCondLst>
+                      <p:childTnLst>
+                        <p:par>
+                          <p:cTn id="4" fill="hold">
+                            <p:stCondLst>
+                              <p:cond delay="0"/>
+                            </p:stCondLst>
+                            <p:childTnLst>
+                              <p:par>
+                                <p:cTn id="5" presetID="2" presetClass="entr" presetSubtype="4" fill="hold" grpId="0" nodeType="clickEffect">
+                                  <p:stCondLst>
+                                    <p:cond delay="0"/>
+                                  </p:stCondLst>
+                                  <p:childTnLst>
+                                    <p:set>
+                                      <p:cBhvr>
+                                        <p:cTn id="6" dur="1" fill="hold">
+                                          <p:stCondLst>
+                                            <p:cond delay="0"/>
+                                          </p:stCondLst>
+                                        </p:cTn>
+                                        <p:tgtEl>
+                                          <p:spTgt spid="2"/>
+                                        </p:tgtEl>
+                                        <p:attrNameLst>
+                                          <p:attrName>style.visibility</p:attrName>
+                                        </p:attrNameLst>
+                                      </p:cBhvr>
+                                      <p:to>
+                                        <p:strVal val="visible"/>
+                                      </p:to>
+                                    </p:set>
+                                    <p:anim calcmode="lin" valueType="num">
+                                      <p:cBhvr additive="base">
+                                        <p:cTn id="7" dur="500" fill="hold"/>
+                                        <p:tgtEl>
+                                          <p:spTgt spid="2"/>
+                                        </p:tgtEl>
+                                        <p:attrNameLst>
+                                          <p:attrName>ppt_x</p:attrName>
+                                        </p:attrNameLst>
+                                      </p:cBhvr>
+                                      <p:tavLst>
+                                        <p:tav tm="0">
+                                          <p:val>
+                                            <p:strVal val="#ppt_x"/>
+                                          </p:val>
+                                        </p:tav>
+                                        <p:tav tm="100000">
+                                          <p:val>
+                                            <p:strVal val="#ppt_x"/>
+                                          </p:val>
+                                        </p:tav>
+                                      </p:tavLst>
+                                    </p:anim>
+                                    <p:anim calcmode="lin" valueType="num">
+                                      <p:cBhvr additive="base">
+                                        <p:cTn id="8" dur="500" fill="hold"/>
+                                        <p:tgtEl>
+                                          <p:spTgt spid="2"/>
+                                        </p:tgtEl>
+                                        <p:attrNameLst>
+                                          <p:attrName>ppt_y</p:attrName>
+                                        </p:attrNameLst>
+                                      </p:cBhvr>
+                                      <p:tavLst>
+                                        <p:tav tm="0">
+                                          <p:val>
+                                            <p:strVal val="1+#ppt_h/2"/>
+                                          </p:val>
+                                        </p:tav>
+                                        <p:tav tm="100000">
+                                          <p:val>
+                                            <p:strVal val="#ppt_y"/>
+                                          </p:val>
+                                        </p:tav>
+                                      </p:tavLst>
+                                    </p:anim>
+                                  </p:childTnLst>
+                                </p:cTn>
+                              </p:par>
+                            </p:childTnLst>
+                          </p:cTn>
+                        </p:par>
+                      </p:childTnLst>
+                    </p:cTn>
+                  </p:par>
+                  <p:par>
+                    <p:cTn id="9" fill="hold">
+                      <p:stCondLst>
+                        <p:cond delay="indefinite"/>
+                      </p:stCondLst>
+                      <p:childTnLst>
+                        <p:par>
+                          <p:cTn id="10" fill="hold">
+                            <p:stCondLst>
+                              <p:cond delay="0"/>
+                            </p:stCondLst>
+                            <p:childTnLst>
+                              <p:par>
+                                <p:cTn id="11" presetID="2" presetClass="entr" presetSubtype="4" fill="hold" nodeType="clickEffect">
+                                  <p:stCondLst>
+                                    <p:cond delay="0"/>
+                                  </p:stCondLst>
+                                  <p:childTnLst>
+                                    <p:set>
+                                      <p:cBhvr>
+                                        <p:cTn id="12" dur="1" fill="hold">
+                                          <p:stCondLst>
+                                            <p:cond delay="0"/>
+                                          </p:stCondLst>
+                                        </p:cTn>
+                                        <p:tgtEl>
+                                          <p:spTgt spid="5"/>
+                                        </p:tgtEl>
+                                        <p:attrNameLst>
+                                          <p:attrName>style.visibility</p:attrName>
+                                        </p:attrNameLst>
+                                      </p:cBhvr>
+                                      <p:to>
+                                        <p:strVal val="visible"/>
+                                      </p:to>
+                                    </p:set>
+                                    <p:anim calcmode="lin" valueType="num">
+                                      <p:cBhvr additive="base">
+                                        <p:cTn id="13" dur="500" fill="hold"/>
+                                        <p:tgtEl>
+                                          <p:spTgt spid="5"/>
+                                        </p:tgtEl>
+                                        <p:attrNameLst>
+                                          <p:attrName>ppt_x</p:attrName>
+                                        </p:attrNameLst>
+                                      </p:cBhvr>
+                                      <p:tavLst>
+                                        <p:tav tm="0">
+                                          <p:val>
+                                            <p:strVal val="#ppt_x"/>
+                                          </p:val>
+                                        </p:tav>
+                                        <p:tav tm="100000">
+                                          <p:val>
+                                            <p:strVal val="#ppt_x"/>
+                                          </p:val>
+                                        </p:tav>
+                                      </p:tavLst>
+                                    </p:anim>
+                                    <p:anim calcmode="lin" valueType="num">
+                                      <p:cBhvr additive="base">
+                                        <p:cTn id="14" dur="500" fill="hold"/>
+                                        <p:tgtEl>
+                                          <p:spTgt spid="5"/>
+                                        </p:tgtEl>
+                                        <p:attrNameLst>
+                                          <p:attrName>ppt_y</p:attrName>
+                                        </p:attrNameLst>
+                                      </p:cBhvr>
+                                      <p:tavLst>
+                                        <p:tav tm="0">
+                                          <p:val>
+                                            <p:strVal val="1+#ppt_h/2"/>
+                                          </p:val>
+                                        </p:tav>
+                                        <p:tav tm="100000">
+                                          <p:val>
+                                            <p:strVal val="#ppt_y"/>
+                                          </p:val>
+                                        </p:tav>
+                                      </p:tavLst>
+                                    </p:anim>
+                                  </p:childTnLst>
+                                </p:cTn>
+                              </p:par>
+                            </p:childTnLst>
+                          </p:cTn>
+                        </p:par>
+                      </p:childTnLst>
+                    </p:cTn>
+                  </p:par>
+                </p:childTnLst>
+              </p:cTn>
+              <p:prevCondLst>
+                <p:cond evt="onPrev" delay="0">
+                  <p:tgtEl>
+                    <p:sldTgt/>
+                  </p:tgtEl>
+                </p:cond>
+              </p:prevCondLst>
+              <p:nextCondLst>
+                <p:cond evt="onNext" delay="0">
+                  <p:tgtEl>
+                    <p:sldTgt/>
+                  </p:tgtEl>
+                </p:cond>
+              </p:nextCondLst>
+            </p:seq>
+          </p:childTnLst>
+        </p:cTn>
+      </p:par>
+    </p:tnLst>
+    <p:bldLst>
+      <p:bldP spid="2" grpId="0"/>
+    </p:bldLst>
+  </p:timing>
+</p:sld>
+</file>
+
 <file path=ppt/slides/slide2.xml><?xml version="1.0" encoding="utf-8"?>
 <p:sld xmlns:a="http://schemas.openxmlformats.org/drawingml/2006/main" xmlns:r="http://schemas.openxmlformats.org/officeDocument/2006/relationships" xmlns:p="http://schemas.openxmlformats.org/presentationml/2006/main">
   <p:cSld>
@@ -3789,7 +4239,7 @@
         <p:spPr>
           <a:xfrm>
             <a:off x="369903" y="3256426"/>
-            <a:ext cx="9034361" cy="3539430"/>
+            <a:ext cx="9034361" cy="3970318"/>
           </a:xfrm>
           <a:prstGeom prst="rect">
             <a:avLst/>
@@ -3867,7 +4317,55 @@
               <a:rPr lang="vi-VN" sz="2800" dirty="0">
                 <a:latin typeface="+mj-lt"/>
               </a:rPr>
-              <a:t>Bóng thi đấu nặng và nhỏ hơn quả bóng đá thông thường.</a:t>
+              <a:t>Bóng thi </a:t>
+            </a:r>
+            <a:r>
+              <a:rPr lang="en-US" sz="2800" dirty="0" err="1">
+                <a:latin typeface="Times New Roman" panose="02020603050405020304" pitchFamily="18" charset="0"/>
+                <a:cs typeface="Times New Roman" panose="02020603050405020304" pitchFamily="18" charset="0"/>
+              </a:rPr>
+              <a:t>đấu</a:t>
+            </a:r>
+            <a:r>
+              <a:rPr lang="en-US" sz="2800" dirty="0">
+                <a:latin typeface="Times New Roman" panose="02020603050405020304" pitchFamily="18" charset="0"/>
+                <a:cs typeface="Times New Roman" panose="02020603050405020304" pitchFamily="18" charset="0"/>
+              </a:rPr>
+              <a:t> </a:t>
+            </a:r>
+            <a:r>
+              <a:rPr lang="en-US" sz="2800" dirty="0" err="1">
+                <a:latin typeface="Times New Roman" panose="02020603050405020304" pitchFamily="18" charset="0"/>
+                <a:cs typeface="Times New Roman" panose="02020603050405020304" pitchFamily="18" charset="0"/>
+              </a:rPr>
+              <a:t>của</a:t>
+            </a:r>
+            <a:r>
+              <a:rPr lang="en-US" sz="2800" dirty="0">
+                <a:latin typeface="Times New Roman" panose="02020603050405020304" pitchFamily="18" charset="0"/>
+                <a:cs typeface="Times New Roman" panose="02020603050405020304" pitchFamily="18" charset="0"/>
+              </a:rPr>
+              <a:t> </a:t>
+            </a:r>
+            <a:r>
+              <a:rPr lang="en-US" sz="2800" dirty="0" err="1">
+                <a:latin typeface="Times New Roman" panose="02020603050405020304" pitchFamily="18" charset="0"/>
+                <a:cs typeface="Times New Roman" panose="02020603050405020304" pitchFamily="18" charset="0"/>
+              </a:rPr>
+              <a:t>sânFutsal</a:t>
+            </a:r>
+            <a:r>
+              <a:rPr lang="vi-VN" sz="2800" dirty="0">
+                <a:latin typeface="Times New Roman" panose="02020603050405020304" pitchFamily="18" charset="0"/>
+                <a:cs typeface="Times New Roman" panose="02020603050405020304" pitchFamily="18" charset="0"/>
+              </a:rPr>
+              <a:t> </a:t>
+            </a:r>
+            <a:r>
+              <a:rPr lang="vi-VN" sz="2800" dirty="0">
+                <a:latin typeface="+mj-lt"/>
+              </a:rPr>
+              <a:t>nặng và nhỏ hơn quả bóng đá thông thường.</a:t>
             </a:r>
           </a:p>
           <a:p>
@@ -4237,6 +4735,1161 @@
           <p:cNvPr id="2" name="Title 1">
             <a:extLst>
               <a:ext uri="{FF2B5EF4-FFF2-40B4-BE49-F238E27FC236}">
+                <a16:creationId xmlns:a16="http://schemas.microsoft.com/office/drawing/2014/main" id="{A5B91F56-A904-4D8C-9F14-AFDE1CA2117C}"/>
+              </a:ext>
+            </a:extLst>
+          </p:cNvPr>
+          <p:cNvSpPr>
+            <a:spLocks noGrp="1"/>
+          </p:cNvSpPr>
+          <p:nvPr>
+            <p:ph type="title"/>
+          </p:nvPr>
+        </p:nvSpPr>
+        <p:spPr/>
+        <p:txBody>
+          <a:bodyPr>
+            <a:normAutofit fontScale="90000"/>
+          </a:bodyPr>
+          <a:lstStyle/>
+          <a:p>
+            <a:r>
+              <a:rPr lang="vi-VN" dirty="0"/>
+              <a:t>sử dụng </a:t>
+            </a:r>
+            <a:r>
+              <a:rPr lang="vi-VN" b="1" dirty="0"/>
+              <a:t>bóng có size 4 và là bóng không nảy</a:t>
+            </a:r>
+            <a:r>
+              <a:rPr lang="vi-VN" dirty="0"/>
+              <a:t>. Đồng thời quả bóng được phủ một lớp da lộn, hoặc nỉ để tăng ma sát khi chơi.</a:t>
+            </a:r>
+            <a:endParaRPr lang="en-US" dirty="0"/>
+          </a:p>
+        </p:txBody>
+      </p:sp>
+      <p:pic>
+        <p:nvPicPr>
+          <p:cNvPr id="7" name="Content Placeholder 6">
+            <a:extLst>
+              <a:ext uri="{FF2B5EF4-FFF2-40B4-BE49-F238E27FC236}">
+                <a16:creationId xmlns:a16="http://schemas.microsoft.com/office/drawing/2014/main" id="{1AAC71A7-573D-42C8-A94D-F8C920E77686}"/>
+              </a:ext>
+            </a:extLst>
+          </p:cNvPr>
+          <p:cNvPicPr>
+            <a:picLocks noGrp="1" noChangeAspect="1"/>
+          </p:cNvPicPr>
+          <p:nvPr>
+            <p:ph idx="1"/>
+          </p:nvPr>
+        </p:nvPicPr>
+        <p:blipFill>
+          <a:blip r:embed="rId2">
+            <a:extLst>
+              <a:ext uri="{28A0092B-C50C-407E-A947-70E740481C1C}">
+                <a14:useLocalDpi xmlns:a14="http://schemas.microsoft.com/office/drawing/2010/main" val="0"/>
+              </a:ext>
+            </a:extLst>
+          </a:blip>
+          <a:stretch>
+            <a:fillRect/>
+          </a:stretch>
+        </p:blipFill>
+        <p:spPr>
+          <a:xfrm>
+            <a:off x="6390216" y="2141537"/>
+            <a:ext cx="5801784" cy="4351338"/>
+          </a:xfrm>
+        </p:spPr>
+      </p:pic>
+      <p:sp>
+        <p:nvSpPr>
+          <p:cNvPr id="8" name="TextBox 7">
+            <a:extLst>
+              <a:ext uri="{FF2B5EF4-FFF2-40B4-BE49-F238E27FC236}">
+                <a16:creationId xmlns:a16="http://schemas.microsoft.com/office/drawing/2014/main" id="{1AC3FADC-61C4-4E9F-BA39-774F1AF31A28}"/>
+              </a:ext>
+            </a:extLst>
+          </p:cNvPr>
+          <p:cNvSpPr txBox="1"/>
+          <p:nvPr/>
+        </p:nvSpPr>
+        <p:spPr>
+          <a:xfrm>
+            <a:off x="954578" y="2141537"/>
+            <a:ext cx="4847207" cy="2431435"/>
+          </a:xfrm>
+          <a:prstGeom prst="rect">
+            <a:avLst/>
+          </a:prstGeom>
+          <a:noFill/>
+        </p:spPr>
+        <p:txBody>
+          <a:bodyPr wrap="square" rtlCol="0">
+            <a:spAutoFit/>
+          </a:bodyPr>
+          <a:lstStyle/>
+          <a:p>
+            <a:r>
+              <a:rPr lang="vi-VN" dirty="0"/>
+              <a:t>Bóng dùng cho sân 5 người thường có độ nặng nhất định, giúp các cầu thủ dễ kiểm soát, cũng như là xoay sở trong không gian hẹp.</a:t>
+            </a:r>
+            <a:endParaRPr lang="en-US" dirty="0"/>
+          </a:p>
+          <a:p>
+            <a:r>
+              <a:rPr lang="en-US" sz="2000" dirty="0" err="1">
+                <a:latin typeface="Times New Roman" panose="02020603050405020304" pitchFamily="18" charset="0"/>
+                <a:cs typeface="Times New Roman" panose="02020603050405020304" pitchFamily="18" charset="0"/>
+              </a:rPr>
+              <a:t>Vì</a:t>
+            </a:r>
+            <a:r>
+              <a:rPr lang="en-US" sz="2000" dirty="0">
+                <a:latin typeface="Times New Roman" panose="02020603050405020304" pitchFamily="18" charset="0"/>
+                <a:cs typeface="Times New Roman" panose="02020603050405020304" pitchFamily="18" charset="0"/>
+              </a:rPr>
+              <a:t> </a:t>
+            </a:r>
+            <a:r>
+              <a:rPr lang="en-US" sz="2000" dirty="0" err="1">
+                <a:latin typeface="Times New Roman" panose="02020603050405020304" pitchFamily="18" charset="0"/>
+                <a:cs typeface="Times New Roman" panose="02020603050405020304" pitchFamily="18" charset="0"/>
+              </a:rPr>
+              <a:t>vậy</a:t>
+            </a:r>
+            <a:r>
+              <a:rPr lang="en-US" sz="2000" dirty="0">
+                <a:latin typeface="Times New Roman" panose="02020603050405020304" pitchFamily="18" charset="0"/>
+                <a:cs typeface="Times New Roman" panose="02020603050405020304" pitchFamily="18" charset="0"/>
+              </a:rPr>
+              <a:t> </a:t>
+            </a:r>
+            <a:r>
+              <a:rPr lang="en-US" sz="2000" dirty="0" err="1">
+                <a:latin typeface="Times New Roman" panose="02020603050405020304" pitchFamily="18" charset="0"/>
+                <a:cs typeface="Times New Roman" panose="02020603050405020304" pitchFamily="18" charset="0"/>
+              </a:rPr>
+              <a:t>cần</a:t>
+            </a:r>
+            <a:r>
+              <a:rPr lang="en-US" sz="2000" dirty="0">
+                <a:latin typeface="Times New Roman" panose="02020603050405020304" pitchFamily="18" charset="0"/>
+                <a:cs typeface="Times New Roman" panose="02020603050405020304" pitchFamily="18" charset="0"/>
+              </a:rPr>
+              <a:t> </a:t>
+            </a:r>
+            <a:r>
+              <a:rPr lang="en-US" sz="2000" dirty="0" err="1">
+                <a:latin typeface="Times New Roman" panose="02020603050405020304" pitchFamily="18" charset="0"/>
+                <a:cs typeface="Times New Roman" panose="02020603050405020304" pitchFamily="18" charset="0"/>
+              </a:rPr>
+              <a:t>chú</a:t>
+            </a:r>
+            <a:r>
+              <a:rPr lang="en-US" sz="2000" dirty="0">
+                <a:latin typeface="Times New Roman" panose="02020603050405020304" pitchFamily="18" charset="0"/>
+                <a:cs typeface="Times New Roman" panose="02020603050405020304" pitchFamily="18" charset="0"/>
+              </a:rPr>
+              <a:t> ý </a:t>
+            </a:r>
+            <a:r>
+              <a:rPr lang="en-US" sz="2000" dirty="0" err="1">
+                <a:latin typeface="Times New Roman" panose="02020603050405020304" pitchFamily="18" charset="0"/>
+                <a:cs typeface="Times New Roman" panose="02020603050405020304" pitchFamily="18" charset="0"/>
+              </a:rPr>
+              <a:t>đến</a:t>
+            </a:r>
+            <a:r>
+              <a:rPr lang="en-US" sz="2000" dirty="0">
+                <a:latin typeface="Times New Roman" panose="02020603050405020304" pitchFamily="18" charset="0"/>
+                <a:cs typeface="Times New Roman" panose="02020603050405020304" pitchFamily="18" charset="0"/>
+              </a:rPr>
+              <a:t> </a:t>
+            </a:r>
+            <a:r>
+              <a:rPr lang="en-US" sz="2000" dirty="0" err="1">
+                <a:latin typeface="Times New Roman" panose="02020603050405020304" pitchFamily="18" charset="0"/>
+                <a:cs typeface="Times New Roman" panose="02020603050405020304" pitchFamily="18" charset="0"/>
+              </a:rPr>
+              <a:t>sự</a:t>
+            </a:r>
+            <a:r>
+              <a:rPr lang="en-US" sz="2000" dirty="0">
+                <a:latin typeface="Times New Roman" panose="02020603050405020304" pitchFamily="18" charset="0"/>
+                <a:cs typeface="Times New Roman" panose="02020603050405020304" pitchFamily="18" charset="0"/>
+              </a:rPr>
+              <a:t> an </a:t>
+            </a:r>
+            <a:r>
+              <a:rPr lang="en-US" sz="2000" dirty="0" err="1">
+                <a:latin typeface="Times New Roman" panose="02020603050405020304" pitchFamily="18" charset="0"/>
+                <a:cs typeface="Times New Roman" panose="02020603050405020304" pitchFamily="18" charset="0"/>
+              </a:rPr>
+              <a:t>toàn</a:t>
+            </a:r>
+            <a:r>
+              <a:rPr lang="en-US" sz="2000" dirty="0">
+                <a:latin typeface="Times New Roman" panose="02020603050405020304" pitchFamily="18" charset="0"/>
+                <a:cs typeface="Times New Roman" panose="02020603050405020304" pitchFamily="18" charset="0"/>
+              </a:rPr>
+              <a:t> </a:t>
+            </a:r>
+            <a:r>
+              <a:rPr lang="en-US" sz="2000" dirty="0" err="1">
+                <a:latin typeface="Times New Roman" panose="02020603050405020304" pitchFamily="18" charset="0"/>
+                <a:cs typeface="Times New Roman" panose="02020603050405020304" pitchFamily="18" charset="0"/>
+              </a:rPr>
+              <a:t>của</a:t>
+            </a:r>
+            <a:r>
+              <a:rPr lang="en-US" sz="2000" dirty="0">
+                <a:latin typeface="Times New Roman" panose="02020603050405020304" pitchFamily="18" charset="0"/>
+                <a:cs typeface="Times New Roman" panose="02020603050405020304" pitchFamily="18" charset="0"/>
+              </a:rPr>
+              <a:t> </a:t>
+            </a:r>
+            <a:r>
+              <a:rPr lang="en-US" sz="2000" dirty="0" err="1">
+                <a:latin typeface="Times New Roman" panose="02020603050405020304" pitchFamily="18" charset="0"/>
+                <a:cs typeface="Times New Roman" panose="02020603050405020304" pitchFamily="18" charset="0"/>
+              </a:rPr>
+              <a:t>các</a:t>
+            </a:r>
+            <a:r>
+              <a:rPr lang="en-US" sz="2000" dirty="0">
+                <a:latin typeface="Times New Roman" panose="02020603050405020304" pitchFamily="18" charset="0"/>
+                <a:cs typeface="Times New Roman" panose="02020603050405020304" pitchFamily="18" charset="0"/>
+              </a:rPr>
+              <a:t> </a:t>
+            </a:r>
+            <a:r>
+              <a:rPr lang="en-US" sz="2000" dirty="0" err="1">
+                <a:latin typeface="Times New Roman" panose="02020603050405020304" pitchFamily="18" charset="0"/>
+                <a:cs typeface="Times New Roman" panose="02020603050405020304" pitchFamily="18" charset="0"/>
+              </a:rPr>
+              <a:t>cầu</a:t>
+            </a:r>
+            <a:r>
+              <a:rPr lang="en-US" sz="2000" dirty="0">
+                <a:latin typeface="Times New Roman" panose="02020603050405020304" pitchFamily="18" charset="0"/>
+                <a:cs typeface="Times New Roman" panose="02020603050405020304" pitchFamily="18" charset="0"/>
+              </a:rPr>
+              <a:t> </a:t>
+            </a:r>
+            <a:r>
+              <a:rPr lang="en-US" sz="2000" dirty="0" err="1">
+                <a:latin typeface="Times New Roman" panose="02020603050405020304" pitchFamily="18" charset="0"/>
+                <a:cs typeface="Times New Roman" panose="02020603050405020304" pitchFamily="18" charset="0"/>
+              </a:rPr>
+              <a:t>thủ</a:t>
+            </a:r>
+            <a:r>
+              <a:rPr lang="en-US" sz="2000" dirty="0">
+                <a:latin typeface="Times New Roman" panose="02020603050405020304" pitchFamily="18" charset="0"/>
+                <a:cs typeface="Times New Roman" panose="02020603050405020304" pitchFamily="18" charset="0"/>
+              </a:rPr>
+              <a:t> ,</a:t>
+            </a:r>
+            <a:r>
+              <a:rPr lang="en-US" sz="2000" dirty="0" err="1">
+                <a:latin typeface="Times New Roman" panose="02020603050405020304" pitchFamily="18" charset="0"/>
+                <a:cs typeface="Times New Roman" panose="02020603050405020304" pitchFamily="18" charset="0"/>
+              </a:rPr>
+              <a:t>đặc</a:t>
+            </a:r>
+            <a:r>
+              <a:rPr lang="en-US" sz="2000" dirty="0">
+                <a:latin typeface="Times New Roman" panose="02020603050405020304" pitchFamily="18" charset="0"/>
+                <a:cs typeface="Times New Roman" panose="02020603050405020304" pitchFamily="18" charset="0"/>
+              </a:rPr>
+              <a:t> </a:t>
+            </a:r>
+            <a:r>
+              <a:rPr lang="en-US" sz="2000" dirty="0" err="1">
+                <a:latin typeface="Times New Roman" panose="02020603050405020304" pitchFamily="18" charset="0"/>
+                <a:cs typeface="Times New Roman" panose="02020603050405020304" pitchFamily="18" charset="0"/>
+              </a:rPr>
+              <a:t>biệt</a:t>
+            </a:r>
+            <a:r>
+              <a:rPr lang="en-US" sz="2000" dirty="0">
+                <a:latin typeface="Times New Roman" panose="02020603050405020304" pitchFamily="18" charset="0"/>
+                <a:cs typeface="Times New Roman" panose="02020603050405020304" pitchFamily="18" charset="0"/>
+              </a:rPr>
+              <a:t> </a:t>
+            </a:r>
+            <a:r>
+              <a:rPr lang="en-US" sz="2000" dirty="0" err="1">
+                <a:latin typeface="Times New Roman" panose="02020603050405020304" pitchFamily="18" charset="0"/>
+                <a:cs typeface="Times New Roman" panose="02020603050405020304" pitchFamily="18" charset="0"/>
+              </a:rPr>
+              <a:t>là</a:t>
+            </a:r>
+            <a:r>
+              <a:rPr lang="en-US" sz="2000" dirty="0">
+                <a:latin typeface="Times New Roman" panose="02020603050405020304" pitchFamily="18" charset="0"/>
+                <a:cs typeface="Times New Roman" panose="02020603050405020304" pitchFamily="18" charset="0"/>
+              </a:rPr>
+              <a:t> </a:t>
+            </a:r>
+            <a:r>
+              <a:rPr lang="en-US" sz="2000" dirty="0" err="1">
+                <a:latin typeface="Times New Roman" panose="02020603050405020304" pitchFamily="18" charset="0"/>
+                <a:cs typeface="Times New Roman" panose="02020603050405020304" pitchFamily="18" charset="0"/>
+              </a:rPr>
+              <a:t>thủ</a:t>
+            </a:r>
+            <a:r>
+              <a:rPr lang="en-US" sz="2000" dirty="0">
+                <a:latin typeface="Times New Roman" panose="02020603050405020304" pitchFamily="18" charset="0"/>
+                <a:cs typeface="Times New Roman" panose="02020603050405020304" pitchFamily="18" charset="0"/>
+              </a:rPr>
+              <a:t> </a:t>
+            </a:r>
+            <a:r>
+              <a:rPr lang="en-US" sz="2000" dirty="0" err="1">
+                <a:latin typeface="Times New Roman" panose="02020603050405020304" pitchFamily="18" charset="0"/>
+                <a:cs typeface="Times New Roman" panose="02020603050405020304" pitchFamily="18" charset="0"/>
+              </a:rPr>
+              <a:t>môn</a:t>
+            </a:r>
+            <a:r>
+              <a:rPr lang="en-US" sz="2000" dirty="0">
+                <a:latin typeface="Times New Roman" panose="02020603050405020304" pitchFamily="18" charset="0"/>
+                <a:cs typeface="Times New Roman" panose="02020603050405020304" pitchFamily="18" charset="0"/>
+              </a:rPr>
+              <a:t> </a:t>
+            </a:r>
+            <a:r>
+              <a:rPr lang="en-US" sz="2000" dirty="0" err="1">
+                <a:latin typeface="Times New Roman" panose="02020603050405020304" pitchFamily="18" charset="0"/>
+                <a:cs typeface="Times New Roman" panose="02020603050405020304" pitchFamily="18" charset="0"/>
+              </a:rPr>
+              <a:t>vì</a:t>
+            </a:r>
+            <a:r>
+              <a:rPr lang="en-US" sz="2000" dirty="0">
+                <a:latin typeface="Times New Roman" panose="02020603050405020304" pitchFamily="18" charset="0"/>
+                <a:cs typeface="Times New Roman" panose="02020603050405020304" pitchFamily="18" charset="0"/>
+              </a:rPr>
+              <a:t> </a:t>
+            </a:r>
+            <a:r>
+              <a:rPr lang="en-US" sz="2000" dirty="0" err="1">
+                <a:latin typeface="Times New Roman" panose="02020603050405020304" pitchFamily="18" charset="0"/>
+                <a:cs typeface="Times New Roman" panose="02020603050405020304" pitchFamily="18" charset="0"/>
+              </a:rPr>
+              <a:t>rất</a:t>
+            </a:r>
+            <a:r>
+              <a:rPr lang="en-US" sz="2000" dirty="0">
+                <a:latin typeface="Times New Roman" panose="02020603050405020304" pitchFamily="18" charset="0"/>
+                <a:cs typeface="Times New Roman" panose="02020603050405020304" pitchFamily="18" charset="0"/>
+              </a:rPr>
+              <a:t> </a:t>
+            </a:r>
+            <a:r>
+              <a:rPr lang="en-US" sz="2000" dirty="0" err="1">
+                <a:latin typeface="Times New Roman" panose="02020603050405020304" pitchFamily="18" charset="0"/>
+                <a:cs typeface="Times New Roman" panose="02020603050405020304" pitchFamily="18" charset="0"/>
+              </a:rPr>
+              <a:t>dễ</a:t>
+            </a:r>
+            <a:r>
+              <a:rPr lang="en-US" sz="2000" dirty="0">
+                <a:latin typeface="Times New Roman" panose="02020603050405020304" pitchFamily="18" charset="0"/>
+                <a:cs typeface="Times New Roman" panose="02020603050405020304" pitchFamily="18" charset="0"/>
+              </a:rPr>
+              <a:t> </a:t>
+            </a:r>
+            <a:r>
+              <a:rPr lang="en-US" sz="2000" dirty="0" err="1">
+                <a:latin typeface="Times New Roman" panose="02020603050405020304" pitchFamily="18" charset="0"/>
+                <a:cs typeface="Times New Roman" panose="02020603050405020304" pitchFamily="18" charset="0"/>
+              </a:rPr>
+              <a:t>gây</a:t>
+            </a:r>
+            <a:r>
+              <a:rPr lang="en-US" sz="2000" dirty="0">
+                <a:latin typeface="Times New Roman" panose="02020603050405020304" pitchFamily="18" charset="0"/>
+                <a:cs typeface="Times New Roman" panose="02020603050405020304" pitchFamily="18" charset="0"/>
+              </a:rPr>
+              <a:t> </a:t>
+            </a:r>
+            <a:r>
+              <a:rPr lang="en-US" sz="2000" dirty="0" err="1">
+                <a:latin typeface="Times New Roman" panose="02020603050405020304" pitchFamily="18" charset="0"/>
+                <a:cs typeface="Times New Roman" panose="02020603050405020304" pitchFamily="18" charset="0"/>
+              </a:rPr>
+              <a:t>chấn</a:t>
+            </a:r>
+            <a:r>
+              <a:rPr lang="en-US" sz="2000" dirty="0">
+                <a:latin typeface="Times New Roman" panose="02020603050405020304" pitchFamily="18" charset="0"/>
+                <a:cs typeface="Times New Roman" panose="02020603050405020304" pitchFamily="18" charset="0"/>
+              </a:rPr>
+              <a:t> </a:t>
+            </a:r>
+            <a:r>
+              <a:rPr lang="en-US" sz="2000" dirty="0" err="1">
+                <a:latin typeface="Times New Roman" panose="02020603050405020304" pitchFamily="18" charset="0"/>
+                <a:cs typeface="Times New Roman" panose="02020603050405020304" pitchFamily="18" charset="0"/>
+              </a:rPr>
+              <a:t>th</a:t>
+            </a:r>
+            <a:r>
+              <a:rPr lang="vi-VN" sz="2000" dirty="0">
+                <a:latin typeface="Times New Roman" panose="02020603050405020304" pitchFamily="18" charset="0"/>
+                <a:cs typeface="Times New Roman" panose="02020603050405020304" pitchFamily="18" charset="0"/>
+              </a:rPr>
+              <a:t>ư</a:t>
+            </a:r>
+            <a:r>
+              <a:rPr lang="en-US" sz="2000" dirty="0" err="1">
+                <a:latin typeface="Times New Roman" panose="02020603050405020304" pitchFamily="18" charset="0"/>
+                <a:cs typeface="Times New Roman" panose="02020603050405020304" pitchFamily="18" charset="0"/>
+              </a:rPr>
+              <a:t>ơng</a:t>
+            </a:r>
+            <a:r>
+              <a:rPr lang="en-US" sz="2000" dirty="0">
+                <a:latin typeface="Times New Roman" panose="02020603050405020304" pitchFamily="18" charset="0"/>
+                <a:cs typeface="Times New Roman" panose="02020603050405020304" pitchFamily="18" charset="0"/>
+              </a:rPr>
+              <a:t> </a:t>
+            </a:r>
+            <a:r>
+              <a:rPr lang="en-US" sz="2000" dirty="0" err="1">
+                <a:latin typeface="Times New Roman" panose="02020603050405020304" pitchFamily="18" charset="0"/>
+                <a:cs typeface="Times New Roman" panose="02020603050405020304" pitchFamily="18" charset="0"/>
+              </a:rPr>
+              <a:t>khi</a:t>
+            </a:r>
+            <a:r>
+              <a:rPr lang="en-US" sz="2000" dirty="0">
+                <a:latin typeface="Times New Roman" panose="02020603050405020304" pitchFamily="18" charset="0"/>
+                <a:cs typeface="Times New Roman" panose="02020603050405020304" pitchFamily="18" charset="0"/>
+              </a:rPr>
+              <a:t> </a:t>
+            </a:r>
+            <a:r>
+              <a:rPr lang="en-US" sz="2000" dirty="0" err="1">
+                <a:latin typeface="Times New Roman" panose="02020603050405020304" pitchFamily="18" charset="0"/>
+                <a:cs typeface="Times New Roman" panose="02020603050405020304" pitchFamily="18" charset="0"/>
+              </a:rPr>
+              <a:t>bắt</a:t>
+            </a:r>
+            <a:r>
+              <a:rPr lang="en-US" sz="2000" dirty="0">
+                <a:latin typeface="Times New Roman" panose="02020603050405020304" pitchFamily="18" charset="0"/>
+                <a:cs typeface="Times New Roman" panose="02020603050405020304" pitchFamily="18" charset="0"/>
+              </a:rPr>
+              <a:t> </a:t>
+            </a:r>
+            <a:r>
+              <a:rPr lang="en-US" sz="2000" dirty="0" err="1">
+                <a:latin typeface="Times New Roman" panose="02020603050405020304" pitchFamily="18" charset="0"/>
+                <a:cs typeface="Times New Roman" panose="02020603050405020304" pitchFamily="18" charset="0"/>
+              </a:rPr>
+              <a:t>bóng</a:t>
+            </a:r>
+            <a:r>
+              <a:rPr lang="en-US" sz="2000" dirty="0">
+                <a:latin typeface="Times New Roman" panose="02020603050405020304" pitchFamily="18" charset="0"/>
+                <a:cs typeface="Times New Roman" panose="02020603050405020304" pitchFamily="18" charset="0"/>
+              </a:rPr>
+              <a:t> .</a:t>
+            </a:r>
+          </a:p>
+          <a:p>
+            <a:endParaRPr lang="en-US" sz="2000" dirty="0"/>
+          </a:p>
+        </p:txBody>
+      </p:sp>
+      <p:pic>
+        <p:nvPicPr>
+          <p:cNvPr id="12" name="Picture 11">
+            <a:extLst>
+              <a:ext uri="{FF2B5EF4-FFF2-40B4-BE49-F238E27FC236}">
+                <a16:creationId xmlns:a16="http://schemas.microsoft.com/office/drawing/2014/main" id="{47878D64-1F9A-495D-81E2-FE6DF184613A}"/>
+              </a:ext>
+            </a:extLst>
+          </p:cNvPr>
+          <p:cNvPicPr>
+            <a:picLocks noChangeAspect="1"/>
+          </p:cNvPicPr>
+          <p:nvPr/>
+        </p:nvPicPr>
+        <p:blipFill>
+          <a:blip r:embed="rId3">
+            <a:extLst>
+              <a:ext uri="{28A0092B-C50C-407E-A947-70E740481C1C}">
+                <a14:useLocalDpi xmlns:a14="http://schemas.microsoft.com/office/drawing/2010/main" val="0"/>
+              </a:ext>
+            </a:extLst>
+          </a:blip>
+          <a:stretch>
+            <a:fillRect/>
+          </a:stretch>
+        </p:blipFill>
+        <p:spPr>
+          <a:xfrm>
+            <a:off x="6390216" y="1988598"/>
+            <a:ext cx="5715000" cy="4279037"/>
+          </a:xfrm>
+          <a:prstGeom prst="rect">
+            <a:avLst/>
+          </a:prstGeom>
+        </p:spPr>
+      </p:pic>
+      <p:sp>
+        <p:nvSpPr>
+          <p:cNvPr id="13" name="TextBox 12">
+            <a:extLst>
+              <a:ext uri="{FF2B5EF4-FFF2-40B4-BE49-F238E27FC236}">
+                <a16:creationId xmlns:a16="http://schemas.microsoft.com/office/drawing/2014/main" id="{A5FDC1DF-3F18-43EF-AD2B-049610F099A2}"/>
+              </a:ext>
+            </a:extLst>
+          </p:cNvPr>
+          <p:cNvSpPr txBox="1"/>
+          <p:nvPr/>
+        </p:nvSpPr>
+        <p:spPr>
+          <a:xfrm>
+            <a:off x="954578" y="4265195"/>
+            <a:ext cx="5141422" cy="2031325"/>
+          </a:xfrm>
+          <a:prstGeom prst="rect">
+            <a:avLst/>
+          </a:prstGeom>
+          <a:noFill/>
+        </p:spPr>
+        <p:txBody>
+          <a:bodyPr wrap="square" rtlCol="0">
+            <a:spAutoFit/>
+          </a:bodyPr>
+          <a:lstStyle/>
+          <a:p>
+            <a:r>
+              <a:rPr lang="en-US" dirty="0" err="1"/>
+              <a:t>Bề</a:t>
+            </a:r>
+            <a:r>
+              <a:rPr lang="en-US" dirty="0"/>
+              <a:t> </a:t>
+            </a:r>
+            <a:r>
+              <a:rPr lang="en-US" dirty="0" err="1"/>
+              <a:t>mặt</a:t>
+            </a:r>
+            <a:r>
+              <a:rPr lang="en-US" dirty="0"/>
+              <a:t> </a:t>
+            </a:r>
+            <a:r>
+              <a:rPr lang="en-US" dirty="0" err="1"/>
+              <a:t>sân</a:t>
+            </a:r>
+            <a:r>
+              <a:rPr lang="en-US" dirty="0"/>
+              <a:t> </a:t>
+            </a:r>
+            <a:r>
+              <a:rPr lang="en-US" dirty="0" err="1"/>
+              <a:t>thi</a:t>
+            </a:r>
+            <a:r>
+              <a:rPr lang="en-US" dirty="0"/>
+              <a:t> </a:t>
+            </a:r>
+            <a:r>
+              <a:rPr lang="en-US" dirty="0" err="1"/>
+              <a:t>đấu</a:t>
+            </a:r>
+            <a:r>
+              <a:rPr lang="en-US" dirty="0"/>
+              <a:t> </a:t>
+            </a:r>
+            <a:r>
+              <a:rPr lang="en-US" dirty="0" err="1"/>
+              <a:t>cho</a:t>
+            </a:r>
+            <a:r>
+              <a:rPr lang="en-US" dirty="0"/>
+              <a:t> </a:t>
+            </a:r>
+            <a:r>
+              <a:rPr lang="en-US" dirty="0" err="1"/>
+              <a:t>môn</a:t>
+            </a:r>
+            <a:r>
+              <a:rPr lang="en-US" dirty="0"/>
+              <a:t> </a:t>
+            </a:r>
+            <a:r>
+              <a:rPr lang="en-US" dirty="0" err="1"/>
+              <a:t>bóng</a:t>
+            </a:r>
+            <a:r>
+              <a:rPr lang="en-US" dirty="0"/>
+              <a:t> </a:t>
+            </a:r>
+            <a:r>
+              <a:rPr lang="en-US" dirty="0" err="1"/>
+              <a:t>đá</a:t>
+            </a:r>
+            <a:r>
+              <a:rPr lang="en-US" dirty="0"/>
+              <a:t> futsal </a:t>
+            </a:r>
+            <a:r>
+              <a:rPr lang="en-US" dirty="0" err="1"/>
+              <a:t>phải</a:t>
+            </a:r>
+            <a:r>
+              <a:rPr lang="en-US" dirty="0"/>
+              <a:t> </a:t>
+            </a:r>
+            <a:r>
+              <a:rPr lang="en-US" dirty="0" err="1"/>
+              <a:t>mềm</a:t>
+            </a:r>
+            <a:r>
+              <a:rPr lang="en-US" dirty="0"/>
+              <a:t> , </a:t>
+            </a:r>
+            <a:r>
+              <a:rPr lang="en-US" dirty="0" err="1"/>
+              <a:t>phẳng</a:t>
+            </a:r>
+            <a:r>
+              <a:rPr lang="en-US" dirty="0"/>
+              <a:t> , </a:t>
+            </a:r>
+            <a:r>
+              <a:rPr lang="en-US" dirty="0" err="1"/>
+              <a:t>chống</a:t>
+            </a:r>
+            <a:r>
+              <a:rPr lang="en-US" dirty="0"/>
+              <a:t> </a:t>
+            </a:r>
+            <a:r>
+              <a:rPr lang="en-US" dirty="0" err="1"/>
+              <a:t>trơn</a:t>
+            </a:r>
+            <a:r>
+              <a:rPr lang="en-US" dirty="0"/>
+              <a:t> </a:t>
+            </a:r>
+            <a:r>
+              <a:rPr lang="en-US" dirty="0" err="1"/>
+              <a:t>trượt</a:t>
+            </a:r>
+            <a:r>
+              <a:rPr lang="en-US" dirty="0"/>
+              <a:t> </a:t>
+            </a:r>
+            <a:r>
+              <a:rPr lang="en-US" dirty="0" err="1"/>
+              <a:t>tốt</a:t>
+            </a:r>
+            <a:r>
+              <a:rPr lang="en-US" dirty="0"/>
+              <a:t> </a:t>
+            </a:r>
+            <a:r>
+              <a:rPr lang="en-US" dirty="0" err="1"/>
+              <a:t>và</a:t>
+            </a:r>
+            <a:r>
+              <a:rPr lang="en-US" dirty="0"/>
+              <a:t> </a:t>
+            </a:r>
+            <a:r>
+              <a:rPr lang="en-US" dirty="0" err="1"/>
+              <a:t>bề</a:t>
+            </a:r>
+            <a:r>
+              <a:rPr lang="en-US" dirty="0"/>
+              <a:t> </a:t>
+            </a:r>
+            <a:r>
+              <a:rPr lang="en-US" dirty="0" err="1"/>
+              <a:t>mặt</a:t>
+            </a:r>
+            <a:r>
+              <a:rPr lang="en-US" dirty="0"/>
+              <a:t> </a:t>
+            </a:r>
+            <a:r>
+              <a:rPr lang="en-US" dirty="0" err="1"/>
+              <a:t>sân</a:t>
+            </a:r>
+            <a:r>
+              <a:rPr lang="en-US" dirty="0"/>
+              <a:t> </a:t>
+            </a:r>
+            <a:r>
+              <a:rPr lang="en-US" dirty="0" err="1"/>
+              <a:t>được</a:t>
+            </a:r>
+            <a:r>
+              <a:rPr lang="en-US" dirty="0"/>
+              <a:t> </a:t>
+            </a:r>
+            <a:r>
+              <a:rPr lang="en-US" dirty="0" err="1"/>
+              <a:t>làm</a:t>
+            </a:r>
+            <a:r>
+              <a:rPr lang="en-US" dirty="0"/>
+              <a:t> </a:t>
+            </a:r>
+            <a:r>
+              <a:rPr lang="en-US" dirty="0" err="1"/>
+              <a:t>bằng</a:t>
+            </a:r>
+            <a:r>
+              <a:rPr lang="en-US" dirty="0"/>
+              <a:t> </a:t>
+            </a:r>
+            <a:r>
+              <a:rPr lang="en-US" dirty="0" err="1"/>
+              <a:t>gỗ</a:t>
+            </a:r>
+            <a:r>
+              <a:rPr lang="en-US" dirty="0"/>
+              <a:t> </a:t>
+            </a:r>
+            <a:r>
+              <a:rPr lang="en-US" dirty="0" err="1"/>
+              <a:t>hoặc</a:t>
+            </a:r>
+            <a:r>
+              <a:rPr lang="en-US" dirty="0"/>
+              <a:t> </a:t>
+            </a:r>
+            <a:r>
+              <a:rPr lang="en-US" dirty="0" err="1"/>
+              <a:t>phủ</a:t>
+            </a:r>
+            <a:r>
+              <a:rPr lang="en-US" dirty="0"/>
+              <a:t> </a:t>
+            </a:r>
+            <a:r>
+              <a:rPr lang="en-US" dirty="0" err="1"/>
+              <a:t>chất</a:t>
+            </a:r>
+            <a:r>
+              <a:rPr lang="en-US" dirty="0"/>
+              <a:t> </a:t>
+            </a:r>
+            <a:r>
+              <a:rPr lang="en-US" dirty="0" err="1"/>
+              <a:t>liệu</a:t>
+            </a:r>
+            <a:r>
+              <a:rPr lang="en-US" dirty="0"/>
+              <a:t> </a:t>
+            </a:r>
+            <a:r>
+              <a:rPr lang="en-US" dirty="0" err="1"/>
+              <a:t>nhân</a:t>
+            </a:r>
+            <a:r>
+              <a:rPr lang="en-US" dirty="0"/>
+              <a:t> </a:t>
+            </a:r>
+            <a:r>
+              <a:rPr lang="en-US" dirty="0" err="1"/>
+              <a:t>tạo</a:t>
+            </a:r>
+            <a:r>
+              <a:rPr lang="en-US" dirty="0"/>
+              <a:t> </a:t>
+            </a:r>
+            <a:r>
+              <a:rPr lang="en-US" dirty="0" err="1"/>
+              <a:t>như</a:t>
+            </a:r>
+            <a:r>
+              <a:rPr lang="en-US" dirty="0"/>
+              <a:t> </a:t>
+            </a:r>
+            <a:r>
+              <a:rPr lang="en-US" dirty="0" err="1"/>
+              <a:t>phảm</a:t>
+            </a:r>
+            <a:r>
+              <a:rPr lang="en-US" dirty="0"/>
+              <a:t> </a:t>
+            </a:r>
+            <a:r>
+              <a:rPr lang="en-US" dirty="0" err="1"/>
+              <a:t>nhựa</a:t>
+            </a:r>
+            <a:r>
+              <a:rPr lang="en-US" dirty="0"/>
+              <a:t> </a:t>
+            </a:r>
+            <a:r>
+              <a:rPr lang="en-US" dirty="0" err="1"/>
+              <a:t>pvc</a:t>
+            </a:r>
+            <a:r>
+              <a:rPr lang="en-US" dirty="0"/>
+              <a:t>.</a:t>
+            </a:r>
+          </a:p>
+          <a:p>
+            <a:r>
+              <a:rPr lang="vi-VN" dirty="0"/>
+              <a:t>Bóng dùng cho sân 5 người thường có độ nặng nhất định, giúp các cầu thủ dễ kiểm soát, cũng như là xoay sở trong không gian hẹp.</a:t>
+            </a:r>
+            <a:endParaRPr lang="en-US" dirty="0"/>
+          </a:p>
+        </p:txBody>
+      </p:sp>
+    </p:spTree>
+    <p:extLst>
+      <p:ext uri="{BB962C8B-B14F-4D97-AF65-F5344CB8AC3E}">
+        <p14:creationId xmlns:p14="http://schemas.microsoft.com/office/powerpoint/2010/main" val="1765691549"/>
+      </p:ext>
+    </p:extLst>
+  </p:cSld>
+  <p:clrMapOvr>
+    <a:masterClrMapping/>
+  </p:clrMapOvr>
+  <p:timing>
+    <p:tnLst>
+      <p:par>
+        <p:cTn id="1" dur="indefinite" restart="never" nodeType="tmRoot">
+          <p:childTnLst>
+            <p:seq concurrent="1" nextAc="seek">
+              <p:cTn id="2" dur="indefinite" nodeType="mainSeq">
+                <p:childTnLst>
+                  <p:par>
+                    <p:cTn id="3" fill="hold">
+                      <p:stCondLst>
+                        <p:cond delay="indefinite"/>
+                      </p:stCondLst>
+                      <p:childTnLst>
+                        <p:par>
+                          <p:cTn id="4" fill="hold">
+                            <p:stCondLst>
+                              <p:cond delay="0"/>
+                            </p:stCondLst>
+                            <p:childTnLst>
+                              <p:par>
+                                <p:cTn id="5" presetID="10" presetClass="entr" presetSubtype="0" fill="hold" grpId="0" nodeType="clickEffect">
+                                  <p:stCondLst>
+                                    <p:cond delay="0"/>
+                                  </p:stCondLst>
+                                  <p:childTnLst>
+                                    <p:set>
+                                      <p:cBhvr>
+                                        <p:cTn id="6" dur="1" fill="hold">
+                                          <p:stCondLst>
+                                            <p:cond delay="0"/>
+                                          </p:stCondLst>
+                                        </p:cTn>
+                                        <p:tgtEl>
+                                          <p:spTgt spid="2"/>
+                                        </p:tgtEl>
+                                        <p:attrNameLst>
+                                          <p:attrName>style.visibility</p:attrName>
+                                        </p:attrNameLst>
+                                      </p:cBhvr>
+                                      <p:to>
+                                        <p:strVal val="visible"/>
+                                      </p:to>
+                                    </p:set>
+                                    <p:animEffect transition="in" filter="fade">
+                                      <p:cBhvr>
+                                        <p:cTn id="7" dur="500"/>
+                                        <p:tgtEl>
+                                          <p:spTgt spid="2"/>
+                                        </p:tgtEl>
+                                      </p:cBhvr>
+                                    </p:animEffect>
+                                  </p:childTnLst>
+                                </p:cTn>
+                              </p:par>
+                            </p:childTnLst>
+                          </p:cTn>
+                        </p:par>
+                      </p:childTnLst>
+                    </p:cTn>
+                  </p:par>
+                  <p:par>
+                    <p:cTn id="8" fill="hold">
+                      <p:stCondLst>
+                        <p:cond delay="indefinite"/>
+                      </p:stCondLst>
+                      <p:childTnLst>
+                        <p:par>
+                          <p:cTn id="9" fill="hold">
+                            <p:stCondLst>
+                              <p:cond delay="0"/>
+                            </p:stCondLst>
+                            <p:childTnLst>
+                              <p:par>
+                                <p:cTn id="10" presetID="10" presetClass="entr" presetSubtype="0" fill="hold" nodeType="clickEffect">
+                                  <p:stCondLst>
+                                    <p:cond delay="0"/>
+                                  </p:stCondLst>
+                                  <p:childTnLst>
+                                    <p:set>
+                                      <p:cBhvr>
+                                        <p:cTn id="11" dur="1" fill="hold">
+                                          <p:stCondLst>
+                                            <p:cond delay="0"/>
+                                          </p:stCondLst>
+                                        </p:cTn>
+                                        <p:tgtEl>
+                                          <p:spTgt spid="7"/>
+                                        </p:tgtEl>
+                                        <p:attrNameLst>
+                                          <p:attrName>style.visibility</p:attrName>
+                                        </p:attrNameLst>
+                                      </p:cBhvr>
+                                      <p:to>
+                                        <p:strVal val="visible"/>
+                                      </p:to>
+                                    </p:set>
+                                    <p:animEffect transition="in" filter="fade">
+                                      <p:cBhvr>
+                                        <p:cTn id="12" dur="500"/>
+                                        <p:tgtEl>
+                                          <p:spTgt spid="7"/>
+                                        </p:tgtEl>
+                                      </p:cBhvr>
+                                    </p:animEffect>
+                                  </p:childTnLst>
+                                </p:cTn>
+                              </p:par>
+                            </p:childTnLst>
+                          </p:cTn>
+                        </p:par>
+                      </p:childTnLst>
+                    </p:cTn>
+                  </p:par>
+                  <p:par>
+                    <p:cTn id="13" fill="hold">
+                      <p:stCondLst>
+                        <p:cond delay="indefinite"/>
+                      </p:stCondLst>
+                      <p:childTnLst>
+                        <p:par>
+                          <p:cTn id="14" fill="hold">
+                            <p:stCondLst>
+                              <p:cond delay="0"/>
+                            </p:stCondLst>
+                            <p:childTnLst>
+                              <p:par>
+                                <p:cTn id="15" presetID="10" presetClass="entr" presetSubtype="0" fill="hold" grpId="0" nodeType="clickEffect">
+                                  <p:stCondLst>
+                                    <p:cond delay="0"/>
+                                  </p:stCondLst>
+                                  <p:childTnLst>
+                                    <p:set>
+                                      <p:cBhvr>
+                                        <p:cTn id="16" dur="1" fill="hold">
+                                          <p:stCondLst>
+                                            <p:cond delay="0"/>
+                                          </p:stCondLst>
+                                        </p:cTn>
+                                        <p:tgtEl>
+                                          <p:spTgt spid="8"/>
+                                        </p:tgtEl>
+                                        <p:attrNameLst>
+                                          <p:attrName>style.visibility</p:attrName>
+                                        </p:attrNameLst>
+                                      </p:cBhvr>
+                                      <p:to>
+                                        <p:strVal val="visible"/>
+                                      </p:to>
+                                    </p:set>
+                                    <p:animEffect transition="in" filter="fade">
+                                      <p:cBhvr>
+                                        <p:cTn id="17" dur="500"/>
+                                        <p:tgtEl>
+                                          <p:spTgt spid="8"/>
+                                        </p:tgtEl>
+                                      </p:cBhvr>
+                                    </p:animEffect>
+                                  </p:childTnLst>
+                                </p:cTn>
+                              </p:par>
+                            </p:childTnLst>
+                          </p:cTn>
+                        </p:par>
+                      </p:childTnLst>
+                    </p:cTn>
+                  </p:par>
+                  <p:par>
+                    <p:cTn id="18" fill="hold">
+                      <p:stCondLst>
+                        <p:cond delay="indefinite"/>
+                      </p:stCondLst>
+                      <p:childTnLst>
+                        <p:par>
+                          <p:cTn id="19" fill="hold">
+                            <p:stCondLst>
+                              <p:cond delay="0"/>
+                            </p:stCondLst>
+                            <p:childTnLst>
+                              <p:par>
+                                <p:cTn id="20" presetID="10" presetClass="entr" presetSubtype="0" fill="hold" nodeType="clickEffect">
+                                  <p:stCondLst>
+                                    <p:cond delay="0"/>
+                                  </p:stCondLst>
+                                  <p:childTnLst>
+                                    <p:set>
+                                      <p:cBhvr>
+                                        <p:cTn id="21" dur="1" fill="hold">
+                                          <p:stCondLst>
+                                            <p:cond delay="0"/>
+                                          </p:stCondLst>
+                                        </p:cTn>
+                                        <p:tgtEl>
+                                          <p:spTgt spid="12"/>
+                                        </p:tgtEl>
+                                        <p:attrNameLst>
+                                          <p:attrName>style.visibility</p:attrName>
+                                        </p:attrNameLst>
+                                      </p:cBhvr>
+                                      <p:to>
+                                        <p:strVal val="visible"/>
+                                      </p:to>
+                                    </p:set>
+                                    <p:animEffect transition="in" filter="fade">
+                                      <p:cBhvr>
+                                        <p:cTn id="22" dur="500"/>
+                                        <p:tgtEl>
+                                          <p:spTgt spid="12"/>
+                                        </p:tgtEl>
+                                      </p:cBhvr>
+                                    </p:animEffect>
+                                  </p:childTnLst>
+                                </p:cTn>
+                              </p:par>
+                            </p:childTnLst>
+                          </p:cTn>
+                        </p:par>
+                      </p:childTnLst>
+                    </p:cTn>
+                  </p:par>
+                  <p:par>
+                    <p:cTn id="23" fill="hold">
+                      <p:stCondLst>
+                        <p:cond delay="indefinite"/>
+                      </p:stCondLst>
+                      <p:childTnLst>
+                        <p:par>
+                          <p:cTn id="24" fill="hold">
+                            <p:stCondLst>
+                              <p:cond delay="0"/>
+                            </p:stCondLst>
+                            <p:childTnLst>
+                              <p:par>
+                                <p:cTn id="25" presetID="10" presetClass="entr" presetSubtype="0" fill="hold" grpId="0" nodeType="clickEffect">
+                                  <p:stCondLst>
+                                    <p:cond delay="0"/>
+                                  </p:stCondLst>
+                                  <p:childTnLst>
+                                    <p:set>
+                                      <p:cBhvr>
+                                        <p:cTn id="26" dur="1" fill="hold">
+                                          <p:stCondLst>
+                                            <p:cond delay="0"/>
+                                          </p:stCondLst>
+                                        </p:cTn>
+                                        <p:tgtEl>
+                                          <p:spTgt spid="13"/>
+                                        </p:tgtEl>
+                                        <p:attrNameLst>
+                                          <p:attrName>style.visibility</p:attrName>
+                                        </p:attrNameLst>
+                                      </p:cBhvr>
+                                      <p:to>
+                                        <p:strVal val="visible"/>
+                                      </p:to>
+                                    </p:set>
+                                    <p:animEffect transition="in" filter="fade">
+                                      <p:cBhvr>
+                                        <p:cTn id="27" dur="500"/>
+                                        <p:tgtEl>
+                                          <p:spTgt spid="13"/>
+                                        </p:tgtEl>
+                                      </p:cBhvr>
+                                    </p:animEffect>
+                                  </p:childTnLst>
+                                </p:cTn>
+                              </p:par>
+                            </p:childTnLst>
+                          </p:cTn>
+                        </p:par>
+                      </p:childTnLst>
+                    </p:cTn>
+                  </p:par>
+                </p:childTnLst>
+              </p:cTn>
+              <p:prevCondLst>
+                <p:cond evt="onPrev" delay="0">
+                  <p:tgtEl>
+                    <p:sldTgt/>
+                  </p:tgtEl>
+                </p:cond>
+              </p:prevCondLst>
+              <p:nextCondLst>
+                <p:cond evt="onNext" delay="0">
+                  <p:tgtEl>
+                    <p:sldTgt/>
+                  </p:tgtEl>
+                </p:cond>
+              </p:nextCondLst>
+            </p:seq>
+          </p:childTnLst>
+        </p:cTn>
+      </p:par>
+    </p:tnLst>
+    <p:bldLst>
+      <p:bldP spid="2" grpId="0"/>
+      <p:bldP spid="8" grpId="0"/>
+      <p:bldP spid="13" grpId="0"/>
+    </p:bldLst>
+  </p:timing>
+</p:sld>
+</file>
+
+<file path=ppt/slides/slide4.xml><?xml version="1.0" encoding="utf-8"?>
+<p:sld xmlns:a="http://schemas.openxmlformats.org/drawingml/2006/main" xmlns:r="http://schemas.openxmlformats.org/officeDocument/2006/relationships" xmlns:p="http://schemas.openxmlformats.org/presentationml/2006/main">
+  <p:cSld>
+    <p:spTree>
+      <p:nvGrpSpPr>
+        <p:cNvPr id="1" name=""/>
+        <p:cNvGrpSpPr/>
+        <p:nvPr/>
+      </p:nvGrpSpPr>
+      <p:grpSpPr>
+        <a:xfrm>
+          <a:off x="0" y="0"/>
+          <a:ext cx="0" cy="0"/>
+          <a:chOff x="0" y="0"/>
+          <a:chExt cx="0" cy="0"/>
+        </a:xfrm>
+      </p:grpSpPr>
+      <p:sp>
+        <p:nvSpPr>
+          <p:cNvPr id="2" name="Title 1">
+            <a:extLst>
+              <a:ext uri="{FF2B5EF4-FFF2-40B4-BE49-F238E27FC236}">
                 <a16:creationId xmlns:a16="http://schemas.microsoft.com/office/drawing/2014/main" id="{A7502138-B048-4B7C-A4C6-9FFC54BC31EA}"/>
               </a:ext>
             </a:extLst>
@@ -4307,22 +5960,6 @@
             <a:r>
               <a:rPr lang="en-US" sz="3600" dirty="0" err="1"/>
               <a:t>thủ</a:t>
-            </a:r>
-            <a:r>
-              <a:rPr lang="en-US" sz="3600" dirty="0"/>
-              <a:t> </a:t>
-            </a:r>
-            <a:r>
-              <a:rPr lang="en-US" sz="3600" dirty="0" err="1"/>
-              <a:t>đá</a:t>
-            </a:r>
-            <a:r>
-              <a:rPr lang="en-US" sz="3600" dirty="0"/>
-              <a:t> </a:t>
-            </a:r>
-            <a:r>
-              <a:rPr lang="en-US" sz="3600" dirty="0" err="1"/>
-              <a:t>chính</a:t>
             </a:r>
             <a:r>
               <a:rPr lang="en-US" sz="3600" dirty="0"/>
@@ -5359,7 +6996,7 @@
         <p:spPr>
           <a:xfrm>
             <a:off x="606641" y="5110928"/>
-            <a:ext cx="6329778" cy="1077218"/>
+            <a:ext cx="6329778" cy="1569660"/>
           </a:xfrm>
           <a:prstGeom prst="rect">
             <a:avLst/>
@@ -5493,6 +7130,84 @@
             <a:endParaRPr lang="en-US" sz="3200" dirty="0">
               <a:latin typeface="+mj-lt"/>
             </a:endParaRPr>
+          </a:p>
+          <a:p>
+            <a:pPr marL="457200" indent="-457200">
+              <a:buFont typeface="Arial" panose="020B0604020202020204" pitchFamily="34" charset="0"/>
+              <a:buChar char="•"/>
+            </a:pPr>
+            <a:r>
+              <a:rPr lang="en-US" sz="3200" dirty="0" err="1">
+                <a:latin typeface="+mj-lt"/>
+              </a:rPr>
+              <a:t>Luật</a:t>
+            </a:r>
+            <a:r>
+              <a:rPr lang="en-US" sz="3200" dirty="0">
+                <a:latin typeface="+mj-lt"/>
+              </a:rPr>
+              <a:t> </a:t>
+            </a:r>
+            <a:r>
+              <a:rPr lang="en-US" sz="3200" dirty="0" err="1">
+                <a:latin typeface="+mj-lt"/>
+              </a:rPr>
+              <a:t>thay</a:t>
+            </a:r>
+            <a:r>
+              <a:rPr lang="en-US" sz="3200" dirty="0">
+                <a:latin typeface="+mj-lt"/>
+              </a:rPr>
+              <a:t> </a:t>
+            </a:r>
+            <a:r>
+              <a:rPr lang="en-US" sz="3200" dirty="0" err="1">
+                <a:latin typeface="+mj-lt"/>
+              </a:rPr>
+              <a:t>người</a:t>
+            </a:r>
+            <a:r>
+              <a:rPr lang="en-US" sz="3200" dirty="0">
+                <a:latin typeface="+mj-lt"/>
+              </a:rPr>
+              <a:t> </a:t>
+            </a:r>
+            <a:r>
+              <a:rPr lang="en-US" sz="3200" dirty="0" err="1">
+                <a:latin typeface="+mj-lt"/>
+              </a:rPr>
+              <a:t>không</a:t>
+            </a:r>
+            <a:r>
+              <a:rPr lang="en-US" sz="3200" dirty="0">
+                <a:latin typeface="+mj-lt"/>
+              </a:rPr>
+              <a:t> </a:t>
+            </a:r>
+            <a:r>
+              <a:rPr lang="en-US" sz="3200" dirty="0" err="1">
+                <a:latin typeface="+mj-lt"/>
+              </a:rPr>
+              <a:t>giới</a:t>
+            </a:r>
+            <a:r>
+              <a:rPr lang="en-US" sz="3200" dirty="0">
+                <a:latin typeface="+mj-lt"/>
+              </a:rPr>
+              <a:t> </a:t>
+            </a:r>
+            <a:r>
+              <a:rPr lang="en-US" sz="3200" dirty="0" err="1">
+                <a:latin typeface="+mj-lt"/>
+              </a:rPr>
+              <a:t>hạn</a:t>
+            </a:r>
+            <a:r>
+              <a:rPr lang="en-US" sz="3200" dirty="0">
+                <a:latin typeface="+mj-lt"/>
+              </a:rPr>
+              <a:t> .</a:t>
+            </a:r>
           </a:p>
         </p:txBody>
       </p:sp>
@@ -6012,7 +7727,1327 @@
 </p:sld>
 </file>
 
-<file path=ppt/slides/slide4.xml><?xml version="1.0" encoding="utf-8"?>
+<file path=ppt/slides/slide5.xml><?xml version="1.0" encoding="utf-8"?>
+<p:sld xmlns:a="http://schemas.openxmlformats.org/drawingml/2006/main" xmlns:r="http://schemas.openxmlformats.org/officeDocument/2006/relationships" xmlns:p="http://schemas.openxmlformats.org/presentationml/2006/main">
+  <p:cSld>
+    <p:spTree>
+      <p:nvGrpSpPr>
+        <p:cNvPr id="1" name=""/>
+        <p:cNvGrpSpPr/>
+        <p:nvPr/>
+      </p:nvGrpSpPr>
+      <p:grpSpPr>
+        <a:xfrm>
+          <a:off x="0" y="0"/>
+          <a:ext cx="0" cy="0"/>
+          <a:chOff x="0" y="0"/>
+          <a:chExt cx="0" cy="0"/>
+        </a:xfrm>
+      </p:grpSpPr>
+      <p:sp>
+        <p:nvSpPr>
+          <p:cNvPr id="2" name="Title 1">
+            <a:extLst>
+              <a:ext uri="{FF2B5EF4-FFF2-40B4-BE49-F238E27FC236}">
+                <a16:creationId xmlns:a16="http://schemas.microsoft.com/office/drawing/2014/main" id="{119D6620-CC8D-4CDD-9D93-D28871F45AE7}"/>
+              </a:ext>
+            </a:extLst>
+          </p:cNvPr>
+          <p:cNvSpPr>
+            <a:spLocks noGrp="1"/>
+          </p:cNvSpPr>
+          <p:nvPr>
+            <p:ph type="title"/>
+          </p:nvPr>
+        </p:nvSpPr>
+        <p:spPr>
+          <a:xfrm>
+            <a:off x="1433004" y="205327"/>
+            <a:ext cx="10515600" cy="1325563"/>
+          </a:xfrm>
+        </p:spPr>
+        <p:txBody>
+          <a:bodyPr/>
+          <a:lstStyle/>
+          <a:p>
+            <a:r>
+              <a:rPr lang="en-US" dirty="0">
+                <a:latin typeface=".Vn3DH" panose="020B7200000000000000" pitchFamily="34" charset="0"/>
+              </a:rPr>
+              <a:t>answer the questions</a:t>
+            </a:r>
+          </a:p>
+        </p:txBody>
+      </p:sp>
+      <p:sp>
+        <p:nvSpPr>
+          <p:cNvPr id="3" name="Content Placeholder 2">
+            <a:extLst>
+              <a:ext uri="{FF2B5EF4-FFF2-40B4-BE49-F238E27FC236}">
+                <a16:creationId xmlns:a16="http://schemas.microsoft.com/office/drawing/2014/main" id="{1092B4CE-E40F-4BAA-B3FB-DF1A4A64E31F}"/>
+              </a:ext>
+            </a:extLst>
+          </p:cNvPr>
+          <p:cNvSpPr>
+            <a:spLocks noGrp="1"/>
+          </p:cNvSpPr>
+          <p:nvPr>
+            <p:ph idx="1"/>
+          </p:nvPr>
+        </p:nvSpPr>
+        <p:spPr/>
+        <p:txBody>
+          <a:bodyPr/>
+          <a:lstStyle/>
+          <a:p>
+            <a:r>
+              <a:rPr lang="en-US" dirty="0"/>
+              <a:t>Question 1 : </a:t>
+            </a:r>
+            <a:r>
+              <a:rPr lang="en-US" dirty="0" err="1"/>
+              <a:t>Thời</a:t>
+            </a:r>
+            <a:r>
+              <a:rPr lang="en-US" dirty="0"/>
+              <a:t> </a:t>
+            </a:r>
+            <a:r>
+              <a:rPr lang="en-US" dirty="0" err="1"/>
+              <a:t>gian</a:t>
+            </a:r>
+            <a:r>
+              <a:rPr lang="en-US" dirty="0"/>
+              <a:t> </a:t>
+            </a:r>
+            <a:r>
+              <a:rPr lang="en-US" dirty="0" err="1"/>
+              <a:t>đá</a:t>
+            </a:r>
+            <a:r>
+              <a:rPr lang="en-US" dirty="0"/>
+              <a:t> </a:t>
+            </a:r>
+            <a:r>
+              <a:rPr lang="en-US" dirty="0" err="1"/>
+              <a:t>biên</a:t>
+            </a:r>
+            <a:r>
+              <a:rPr lang="en-US" dirty="0"/>
+              <a:t> </a:t>
+            </a:r>
+            <a:r>
+              <a:rPr lang="en-US" dirty="0" err="1"/>
+              <a:t>và</a:t>
+            </a:r>
+            <a:r>
+              <a:rPr lang="en-US" dirty="0"/>
+              <a:t> </a:t>
+            </a:r>
+            <a:r>
+              <a:rPr lang="en-US" dirty="0" err="1"/>
+              <a:t>phạt</a:t>
+            </a:r>
+            <a:r>
+              <a:rPr lang="en-US" dirty="0"/>
+              <a:t> </a:t>
+            </a:r>
+            <a:r>
+              <a:rPr lang="en-US" dirty="0" err="1"/>
+              <a:t>góc</a:t>
+            </a:r>
+            <a:r>
+              <a:rPr lang="en-US" dirty="0"/>
+              <a:t> </a:t>
+            </a:r>
+            <a:r>
+              <a:rPr lang="en-US" dirty="0" err="1"/>
+              <a:t>sẽ</a:t>
+            </a:r>
+            <a:r>
+              <a:rPr lang="en-US" dirty="0"/>
+              <a:t> </a:t>
+            </a:r>
+            <a:r>
+              <a:rPr lang="en-US" dirty="0" err="1"/>
+              <a:t>là</a:t>
+            </a:r>
+            <a:r>
+              <a:rPr lang="en-US" dirty="0"/>
+              <a:t> bao </a:t>
+            </a:r>
+            <a:r>
+              <a:rPr lang="en-US" dirty="0" err="1"/>
+              <a:t>lâu</a:t>
+            </a:r>
+            <a:r>
+              <a:rPr lang="en-US" dirty="0"/>
+              <a:t> !? </a:t>
+            </a:r>
+          </a:p>
+          <a:p>
+            <a:r>
+              <a:rPr lang="en-US" dirty="0"/>
+              <a:t>Question 2 : Bao </a:t>
+            </a:r>
+            <a:r>
+              <a:rPr lang="en-US" dirty="0" err="1"/>
+              <a:t>nhiêu</a:t>
+            </a:r>
+            <a:r>
+              <a:rPr lang="en-US" dirty="0"/>
+              <a:t> </a:t>
+            </a:r>
+            <a:r>
+              <a:rPr lang="en-US" dirty="0" err="1"/>
+              <a:t>lỗi</a:t>
+            </a:r>
+            <a:r>
+              <a:rPr lang="en-US" dirty="0"/>
+              <a:t> </a:t>
+            </a:r>
+            <a:r>
+              <a:rPr lang="en-US" dirty="0" err="1"/>
+              <a:t>thì</a:t>
+            </a:r>
+            <a:r>
+              <a:rPr lang="en-US" dirty="0"/>
+              <a:t> </a:t>
+            </a:r>
+            <a:r>
+              <a:rPr lang="en-US" dirty="0" err="1"/>
+              <a:t>sẽ</a:t>
+            </a:r>
+            <a:r>
+              <a:rPr lang="en-US" dirty="0"/>
+              <a:t> đ</a:t>
+            </a:r>
+            <a:r>
+              <a:rPr lang="vi-VN" dirty="0"/>
+              <a:t>ư</a:t>
+            </a:r>
+            <a:r>
+              <a:rPr lang="en-US" dirty="0" err="1"/>
+              <a:t>ợc</a:t>
+            </a:r>
+            <a:r>
+              <a:rPr lang="en-US" dirty="0"/>
+              <a:t> </a:t>
+            </a:r>
+            <a:r>
+              <a:rPr lang="en-US" dirty="0" err="1"/>
+              <a:t>đá</a:t>
+            </a:r>
+            <a:r>
+              <a:rPr lang="en-US" dirty="0"/>
+              <a:t> </a:t>
+            </a:r>
+            <a:r>
+              <a:rPr lang="en-US" dirty="0" err="1"/>
+              <a:t>phạt</a:t>
+            </a:r>
+            <a:r>
+              <a:rPr lang="en-US" dirty="0"/>
+              <a:t> </a:t>
+            </a:r>
+            <a:r>
+              <a:rPr lang="en-US" dirty="0" err="1"/>
+              <a:t>trực</a:t>
+            </a:r>
+            <a:r>
+              <a:rPr lang="en-US" dirty="0"/>
+              <a:t> </a:t>
+            </a:r>
+            <a:r>
+              <a:rPr lang="en-US" dirty="0" err="1"/>
+              <a:t>tiếp</a:t>
+            </a:r>
+            <a:r>
+              <a:rPr lang="en-US" dirty="0"/>
+              <a:t> !?</a:t>
+            </a:r>
+          </a:p>
+          <a:p>
+            <a:r>
+              <a:rPr lang="en-US" dirty="0"/>
+              <a:t>Question 3 : </a:t>
+            </a:r>
+            <a:r>
+              <a:rPr lang="en-US" dirty="0" err="1"/>
+              <a:t>thủ</a:t>
+            </a:r>
+            <a:r>
+              <a:rPr lang="en-US" dirty="0"/>
+              <a:t> </a:t>
+            </a:r>
+            <a:r>
+              <a:rPr lang="en-US" dirty="0" err="1"/>
+              <a:t>môn</a:t>
+            </a:r>
+            <a:r>
+              <a:rPr lang="en-US" dirty="0"/>
+              <a:t> </a:t>
+            </a:r>
+            <a:r>
+              <a:rPr lang="en-US" dirty="0" err="1"/>
+              <a:t>có</a:t>
+            </a:r>
+            <a:r>
+              <a:rPr lang="en-US" dirty="0"/>
+              <a:t> </a:t>
+            </a:r>
+            <a:r>
+              <a:rPr lang="en-US" dirty="0" err="1"/>
+              <a:t>quyền</a:t>
+            </a:r>
+            <a:r>
+              <a:rPr lang="en-US" dirty="0"/>
+              <a:t> đ</a:t>
+            </a:r>
+            <a:r>
+              <a:rPr lang="vi-VN" dirty="0"/>
+              <a:t>ư</a:t>
+            </a:r>
+            <a:r>
+              <a:rPr lang="en-US" dirty="0" err="1"/>
+              <a:t>ợc</a:t>
+            </a:r>
+            <a:r>
+              <a:rPr lang="en-US" dirty="0"/>
+              <a:t> </a:t>
+            </a:r>
+            <a:r>
+              <a:rPr lang="en-US" dirty="0" err="1"/>
+              <a:t>ch</a:t>
+            </a:r>
+            <a:r>
+              <a:rPr lang="vi-VN" dirty="0"/>
+              <a:t>ơ</a:t>
+            </a:r>
+            <a:r>
+              <a:rPr lang="en-US" dirty="0" err="1"/>
+              <a:t>i</a:t>
+            </a:r>
+            <a:r>
+              <a:rPr lang="en-US" dirty="0"/>
+              <a:t> </a:t>
+            </a:r>
+            <a:r>
+              <a:rPr lang="en-US" dirty="0" err="1"/>
+              <a:t>bóng</a:t>
+            </a:r>
+            <a:r>
+              <a:rPr lang="en-US" dirty="0"/>
+              <a:t> </a:t>
+            </a:r>
+            <a:r>
+              <a:rPr lang="en-US" dirty="0" err="1"/>
+              <a:t>nh</a:t>
+            </a:r>
+            <a:r>
+              <a:rPr lang="vi-VN" dirty="0"/>
+              <a:t>ư</a:t>
+            </a:r>
+            <a:r>
+              <a:rPr lang="en-US" dirty="0"/>
+              <a:t> </a:t>
+            </a:r>
+            <a:r>
+              <a:rPr lang="en-US" dirty="0" err="1"/>
+              <a:t>các</a:t>
+            </a:r>
+            <a:r>
+              <a:rPr lang="en-US" dirty="0"/>
+              <a:t> </a:t>
+            </a:r>
+            <a:r>
+              <a:rPr lang="en-US" dirty="0" err="1"/>
+              <a:t>cầu</a:t>
+            </a:r>
+            <a:r>
+              <a:rPr lang="en-US" dirty="0"/>
+              <a:t> </a:t>
+            </a:r>
+            <a:r>
+              <a:rPr lang="en-US" dirty="0" err="1"/>
+              <a:t>thủ</a:t>
+            </a:r>
+            <a:r>
+              <a:rPr lang="en-US" dirty="0"/>
+              <a:t> </a:t>
+            </a:r>
+            <a:r>
+              <a:rPr lang="en-US" dirty="0" err="1"/>
+              <a:t>khác</a:t>
+            </a:r>
+            <a:r>
+              <a:rPr lang="en-US" dirty="0"/>
+              <a:t> </a:t>
+            </a:r>
+            <a:r>
+              <a:rPr lang="en-US" dirty="0" err="1"/>
+              <a:t>không</a:t>
+            </a:r>
+            <a:r>
+              <a:rPr lang="en-US" dirty="0"/>
+              <a:t> !?</a:t>
+            </a:r>
+          </a:p>
+        </p:txBody>
+      </p:sp>
+      <p:pic>
+        <p:nvPicPr>
+          <p:cNvPr id="10" name="Picture 9">
+            <a:extLst>
+              <a:ext uri="{FF2B5EF4-FFF2-40B4-BE49-F238E27FC236}">
+                <a16:creationId xmlns:a16="http://schemas.microsoft.com/office/drawing/2014/main" id="{6BFC8E35-619A-4301-A2CC-E682CA5E719E}"/>
+              </a:ext>
+            </a:extLst>
+          </p:cNvPr>
+          <p:cNvPicPr>
+            <a:picLocks noChangeAspect="1"/>
+          </p:cNvPicPr>
+          <p:nvPr/>
+        </p:nvPicPr>
+        <p:blipFill>
+          <a:blip r:embed="rId2">
+            <a:extLst>
+              <a:ext uri="{28A0092B-C50C-407E-A947-70E740481C1C}">
+                <a14:useLocalDpi xmlns:a14="http://schemas.microsoft.com/office/drawing/2010/main" val="0"/>
+              </a:ext>
+            </a:extLst>
+          </a:blip>
+          <a:stretch>
+            <a:fillRect/>
+          </a:stretch>
+        </p:blipFill>
+        <p:spPr>
+          <a:xfrm>
+            <a:off x="2043159" y="-135569"/>
+            <a:ext cx="6667500" cy="6667500"/>
+          </a:xfrm>
+          <a:prstGeom prst="rect">
+            <a:avLst/>
+          </a:prstGeom>
+        </p:spPr>
+      </p:pic>
+    </p:spTree>
+    <p:extLst>
+      <p:ext uri="{BB962C8B-B14F-4D97-AF65-F5344CB8AC3E}">
+        <p14:creationId xmlns:p14="http://schemas.microsoft.com/office/powerpoint/2010/main" val="2831837106"/>
+      </p:ext>
+    </p:extLst>
+  </p:cSld>
+  <p:clrMapOvr>
+    <a:masterClrMapping/>
+  </p:clrMapOvr>
+  <p:timing>
+    <p:tnLst>
+      <p:par>
+        <p:cTn id="1" dur="indefinite" restart="never" nodeType="tmRoot">
+          <p:childTnLst>
+            <p:seq concurrent="1" nextAc="seek">
+              <p:cTn id="2" dur="indefinite" nodeType="mainSeq">
+                <p:childTnLst>
+                  <p:par>
+                    <p:cTn id="3" fill="hold">
+                      <p:stCondLst>
+                        <p:cond delay="indefinite"/>
+                      </p:stCondLst>
+                      <p:childTnLst>
+                        <p:par>
+                          <p:cTn id="4" fill="hold">
+                            <p:stCondLst>
+                              <p:cond delay="0"/>
+                            </p:stCondLst>
+                            <p:childTnLst>
+                              <p:par>
+                                <p:cTn id="5" presetID="2" presetClass="entr" presetSubtype="4" fill="hold" grpId="0" nodeType="clickEffect">
+                                  <p:stCondLst>
+                                    <p:cond delay="0"/>
+                                  </p:stCondLst>
+                                  <p:childTnLst>
+                                    <p:set>
+                                      <p:cBhvr>
+                                        <p:cTn id="6" dur="1" fill="hold">
+                                          <p:stCondLst>
+                                            <p:cond delay="0"/>
+                                          </p:stCondLst>
+                                        </p:cTn>
+                                        <p:tgtEl>
+                                          <p:spTgt spid="2"/>
+                                        </p:tgtEl>
+                                        <p:attrNameLst>
+                                          <p:attrName>style.visibility</p:attrName>
+                                        </p:attrNameLst>
+                                      </p:cBhvr>
+                                      <p:to>
+                                        <p:strVal val="visible"/>
+                                      </p:to>
+                                    </p:set>
+                                    <p:anim calcmode="lin" valueType="num">
+                                      <p:cBhvr additive="base">
+                                        <p:cTn id="7" dur="500" fill="hold"/>
+                                        <p:tgtEl>
+                                          <p:spTgt spid="2"/>
+                                        </p:tgtEl>
+                                        <p:attrNameLst>
+                                          <p:attrName>ppt_x</p:attrName>
+                                        </p:attrNameLst>
+                                      </p:cBhvr>
+                                      <p:tavLst>
+                                        <p:tav tm="0">
+                                          <p:val>
+                                            <p:strVal val="#ppt_x"/>
+                                          </p:val>
+                                        </p:tav>
+                                        <p:tav tm="100000">
+                                          <p:val>
+                                            <p:strVal val="#ppt_x"/>
+                                          </p:val>
+                                        </p:tav>
+                                      </p:tavLst>
+                                    </p:anim>
+                                    <p:anim calcmode="lin" valueType="num">
+                                      <p:cBhvr additive="base">
+                                        <p:cTn id="8" dur="500" fill="hold"/>
+                                        <p:tgtEl>
+                                          <p:spTgt spid="2"/>
+                                        </p:tgtEl>
+                                        <p:attrNameLst>
+                                          <p:attrName>ppt_y</p:attrName>
+                                        </p:attrNameLst>
+                                      </p:cBhvr>
+                                      <p:tavLst>
+                                        <p:tav tm="0">
+                                          <p:val>
+                                            <p:strVal val="1+#ppt_h/2"/>
+                                          </p:val>
+                                        </p:tav>
+                                        <p:tav tm="100000">
+                                          <p:val>
+                                            <p:strVal val="#ppt_y"/>
+                                          </p:val>
+                                        </p:tav>
+                                      </p:tavLst>
+                                    </p:anim>
+                                  </p:childTnLst>
+                                </p:cTn>
+                              </p:par>
+                            </p:childTnLst>
+                          </p:cTn>
+                        </p:par>
+                      </p:childTnLst>
+                    </p:cTn>
+                  </p:par>
+                  <p:par>
+                    <p:cTn id="9" fill="hold">
+                      <p:stCondLst>
+                        <p:cond delay="indefinite"/>
+                      </p:stCondLst>
+                      <p:childTnLst>
+                        <p:par>
+                          <p:cTn id="10" fill="hold">
+                            <p:stCondLst>
+                              <p:cond delay="0"/>
+                            </p:stCondLst>
+                            <p:childTnLst>
+                              <p:par>
+                                <p:cTn id="11" presetID="2" presetClass="entr" presetSubtype="4" fill="hold" grpId="0" nodeType="clickEffect">
+                                  <p:stCondLst>
+                                    <p:cond delay="0"/>
+                                  </p:stCondLst>
+                                  <p:childTnLst>
+                                    <p:set>
+                                      <p:cBhvr>
+                                        <p:cTn id="12" dur="1" fill="hold">
+                                          <p:stCondLst>
+                                            <p:cond delay="0"/>
+                                          </p:stCondLst>
+                                        </p:cTn>
+                                        <p:tgtEl>
+                                          <p:spTgt spid="3">
+                                            <p:txEl>
+                                              <p:pRg st="0" end="0"/>
+                                            </p:txEl>
+                                          </p:spTgt>
+                                        </p:tgtEl>
+                                        <p:attrNameLst>
+                                          <p:attrName>style.visibility</p:attrName>
+                                        </p:attrNameLst>
+                                      </p:cBhvr>
+                                      <p:to>
+                                        <p:strVal val="visible"/>
+                                      </p:to>
+                                    </p:set>
+                                    <p:anim calcmode="lin" valueType="num">
+                                      <p:cBhvr additive="base">
+                                        <p:cTn id="13" dur="500" fill="hold"/>
+                                        <p:tgtEl>
+                                          <p:spTgt spid="3">
+                                            <p:txEl>
+                                              <p:pRg st="0" end="0"/>
+                                            </p:txEl>
+                                          </p:spTgt>
+                                        </p:tgtEl>
+                                        <p:attrNameLst>
+                                          <p:attrName>ppt_x</p:attrName>
+                                        </p:attrNameLst>
+                                      </p:cBhvr>
+                                      <p:tavLst>
+                                        <p:tav tm="0">
+                                          <p:val>
+                                            <p:strVal val="#ppt_x"/>
+                                          </p:val>
+                                        </p:tav>
+                                        <p:tav tm="100000">
+                                          <p:val>
+                                            <p:strVal val="#ppt_x"/>
+                                          </p:val>
+                                        </p:tav>
+                                      </p:tavLst>
+                                    </p:anim>
+                                    <p:anim calcmode="lin" valueType="num">
+                                      <p:cBhvr additive="base">
+                                        <p:cTn id="14" dur="500" fill="hold"/>
+                                        <p:tgtEl>
+                                          <p:spTgt spid="3">
+                                            <p:txEl>
+                                              <p:pRg st="0" end="0"/>
+                                            </p:txEl>
+                                          </p:spTgt>
+                                        </p:tgtEl>
+                                        <p:attrNameLst>
+                                          <p:attrName>ppt_y</p:attrName>
+                                        </p:attrNameLst>
+                                      </p:cBhvr>
+                                      <p:tavLst>
+                                        <p:tav tm="0">
+                                          <p:val>
+                                            <p:strVal val="1+#ppt_h/2"/>
+                                          </p:val>
+                                        </p:tav>
+                                        <p:tav tm="100000">
+                                          <p:val>
+                                            <p:strVal val="#ppt_y"/>
+                                          </p:val>
+                                        </p:tav>
+                                      </p:tavLst>
+                                    </p:anim>
+                                  </p:childTnLst>
+                                </p:cTn>
+                              </p:par>
+                            </p:childTnLst>
+                          </p:cTn>
+                        </p:par>
+                      </p:childTnLst>
+                    </p:cTn>
+                  </p:par>
+                  <p:par>
+                    <p:cTn id="15" fill="hold">
+                      <p:stCondLst>
+                        <p:cond delay="indefinite"/>
+                      </p:stCondLst>
+                      <p:childTnLst>
+                        <p:par>
+                          <p:cTn id="16" fill="hold">
+                            <p:stCondLst>
+                              <p:cond delay="0"/>
+                            </p:stCondLst>
+                            <p:childTnLst>
+                              <p:par>
+                                <p:cTn id="17" presetID="2" presetClass="entr" presetSubtype="4" fill="hold" grpId="0" nodeType="clickEffect">
+                                  <p:stCondLst>
+                                    <p:cond delay="0"/>
+                                  </p:stCondLst>
+                                  <p:childTnLst>
+                                    <p:set>
+                                      <p:cBhvr>
+                                        <p:cTn id="18" dur="1" fill="hold">
+                                          <p:stCondLst>
+                                            <p:cond delay="0"/>
+                                          </p:stCondLst>
+                                        </p:cTn>
+                                        <p:tgtEl>
+                                          <p:spTgt spid="3">
+                                            <p:txEl>
+                                              <p:pRg st="1" end="1"/>
+                                            </p:txEl>
+                                          </p:spTgt>
+                                        </p:tgtEl>
+                                        <p:attrNameLst>
+                                          <p:attrName>style.visibility</p:attrName>
+                                        </p:attrNameLst>
+                                      </p:cBhvr>
+                                      <p:to>
+                                        <p:strVal val="visible"/>
+                                      </p:to>
+                                    </p:set>
+                                    <p:anim calcmode="lin" valueType="num">
+                                      <p:cBhvr additive="base">
+                                        <p:cTn id="19" dur="500" fill="hold"/>
+                                        <p:tgtEl>
+                                          <p:spTgt spid="3">
+                                            <p:txEl>
+                                              <p:pRg st="1" end="1"/>
+                                            </p:txEl>
+                                          </p:spTgt>
+                                        </p:tgtEl>
+                                        <p:attrNameLst>
+                                          <p:attrName>ppt_x</p:attrName>
+                                        </p:attrNameLst>
+                                      </p:cBhvr>
+                                      <p:tavLst>
+                                        <p:tav tm="0">
+                                          <p:val>
+                                            <p:strVal val="#ppt_x"/>
+                                          </p:val>
+                                        </p:tav>
+                                        <p:tav tm="100000">
+                                          <p:val>
+                                            <p:strVal val="#ppt_x"/>
+                                          </p:val>
+                                        </p:tav>
+                                      </p:tavLst>
+                                    </p:anim>
+                                    <p:anim calcmode="lin" valueType="num">
+                                      <p:cBhvr additive="base">
+                                        <p:cTn id="20" dur="500" fill="hold"/>
+                                        <p:tgtEl>
+                                          <p:spTgt spid="3">
+                                            <p:txEl>
+                                              <p:pRg st="1" end="1"/>
+                                            </p:txEl>
+                                          </p:spTgt>
+                                        </p:tgtEl>
+                                        <p:attrNameLst>
+                                          <p:attrName>ppt_y</p:attrName>
+                                        </p:attrNameLst>
+                                      </p:cBhvr>
+                                      <p:tavLst>
+                                        <p:tav tm="0">
+                                          <p:val>
+                                            <p:strVal val="1+#ppt_h/2"/>
+                                          </p:val>
+                                        </p:tav>
+                                        <p:tav tm="100000">
+                                          <p:val>
+                                            <p:strVal val="#ppt_y"/>
+                                          </p:val>
+                                        </p:tav>
+                                      </p:tavLst>
+                                    </p:anim>
+                                  </p:childTnLst>
+                                </p:cTn>
+                              </p:par>
+                            </p:childTnLst>
+                          </p:cTn>
+                        </p:par>
+                      </p:childTnLst>
+                    </p:cTn>
+                  </p:par>
+                  <p:par>
+                    <p:cTn id="21" fill="hold">
+                      <p:stCondLst>
+                        <p:cond delay="indefinite"/>
+                      </p:stCondLst>
+                      <p:childTnLst>
+                        <p:par>
+                          <p:cTn id="22" fill="hold">
+                            <p:stCondLst>
+                              <p:cond delay="0"/>
+                            </p:stCondLst>
+                            <p:childTnLst>
+                              <p:par>
+                                <p:cTn id="23" presetID="2" presetClass="entr" presetSubtype="4" fill="hold" grpId="0" nodeType="clickEffect">
+                                  <p:stCondLst>
+                                    <p:cond delay="0"/>
+                                  </p:stCondLst>
+                                  <p:childTnLst>
+                                    <p:set>
+                                      <p:cBhvr>
+                                        <p:cTn id="24" dur="1" fill="hold">
+                                          <p:stCondLst>
+                                            <p:cond delay="0"/>
+                                          </p:stCondLst>
+                                        </p:cTn>
+                                        <p:tgtEl>
+                                          <p:spTgt spid="3">
+                                            <p:txEl>
+                                              <p:pRg st="2" end="2"/>
+                                            </p:txEl>
+                                          </p:spTgt>
+                                        </p:tgtEl>
+                                        <p:attrNameLst>
+                                          <p:attrName>style.visibility</p:attrName>
+                                        </p:attrNameLst>
+                                      </p:cBhvr>
+                                      <p:to>
+                                        <p:strVal val="visible"/>
+                                      </p:to>
+                                    </p:set>
+                                    <p:anim calcmode="lin" valueType="num">
+                                      <p:cBhvr additive="base">
+                                        <p:cTn id="25" dur="500" fill="hold"/>
+                                        <p:tgtEl>
+                                          <p:spTgt spid="3">
+                                            <p:txEl>
+                                              <p:pRg st="2" end="2"/>
+                                            </p:txEl>
+                                          </p:spTgt>
+                                        </p:tgtEl>
+                                        <p:attrNameLst>
+                                          <p:attrName>ppt_x</p:attrName>
+                                        </p:attrNameLst>
+                                      </p:cBhvr>
+                                      <p:tavLst>
+                                        <p:tav tm="0">
+                                          <p:val>
+                                            <p:strVal val="#ppt_x"/>
+                                          </p:val>
+                                        </p:tav>
+                                        <p:tav tm="100000">
+                                          <p:val>
+                                            <p:strVal val="#ppt_x"/>
+                                          </p:val>
+                                        </p:tav>
+                                      </p:tavLst>
+                                    </p:anim>
+                                    <p:anim calcmode="lin" valueType="num">
+                                      <p:cBhvr additive="base">
+                                        <p:cTn id="26" dur="500" fill="hold"/>
+                                        <p:tgtEl>
+                                          <p:spTgt spid="3">
+                                            <p:txEl>
+                                              <p:pRg st="2" end="2"/>
+                                            </p:txEl>
+                                          </p:spTgt>
+                                        </p:tgtEl>
+                                        <p:attrNameLst>
+                                          <p:attrName>ppt_y</p:attrName>
+                                        </p:attrNameLst>
+                                      </p:cBhvr>
+                                      <p:tavLst>
+                                        <p:tav tm="0">
+                                          <p:val>
+                                            <p:strVal val="1+#ppt_h/2"/>
+                                          </p:val>
+                                        </p:tav>
+                                        <p:tav tm="100000">
+                                          <p:val>
+                                            <p:strVal val="#ppt_y"/>
+                                          </p:val>
+                                        </p:tav>
+                                      </p:tavLst>
+                                    </p:anim>
+                                  </p:childTnLst>
+                                </p:cTn>
+                              </p:par>
+                            </p:childTnLst>
+                          </p:cTn>
+                        </p:par>
+                      </p:childTnLst>
+                    </p:cTn>
+                  </p:par>
+                  <p:par>
+                    <p:cTn id="27" fill="hold">
+                      <p:stCondLst>
+                        <p:cond delay="indefinite"/>
+                      </p:stCondLst>
+                      <p:childTnLst>
+                        <p:par>
+                          <p:cTn id="28" fill="hold">
+                            <p:stCondLst>
+                              <p:cond delay="0"/>
+                            </p:stCondLst>
+                            <p:childTnLst>
+                              <p:par>
+                                <p:cTn id="29" presetID="2" presetClass="entr" presetSubtype="4" fill="hold" nodeType="clickEffect">
+                                  <p:stCondLst>
+                                    <p:cond delay="0"/>
+                                  </p:stCondLst>
+                                  <p:childTnLst>
+                                    <p:set>
+                                      <p:cBhvr>
+                                        <p:cTn id="30" dur="1" fill="hold">
+                                          <p:stCondLst>
+                                            <p:cond delay="0"/>
+                                          </p:stCondLst>
+                                        </p:cTn>
+                                        <p:tgtEl>
+                                          <p:spTgt spid="10"/>
+                                        </p:tgtEl>
+                                        <p:attrNameLst>
+                                          <p:attrName>style.visibility</p:attrName>
+                                        </p:attrNameLst>
+                                      </p:cBhvr>
+                                      <p:to>
+                                        <p:strVal val="visible"/>
+                                      </p:to>
+                                    </p:set>
+                                    <p:anim calcmode="lin" valueType="num">
+                                      <p:cBhvr additive="base">
+                                        <p:cTn id="31" dur="500" fill="hold"/>
+                                        <p:tgtEl>
+                                          <p:spTgt spid="10"/>
+                                        </p:tgtEl>
+                                        <p:attrNameLst>
+                                          <p:attrName>ppt_x</p:attrName>
+                                        </p:attrNameLst>
+                                      </p:cBhvr>
+                                      <p:tavLst>
+                                        <p:tav tm="0">
+                                          <p:val>
+                                            <p:strVal val="#ppt_x"/>
+                                          </p:val>
+                                        </p:tav>
+                                        <p:tav tm="100000">
+                                          <p:val>
+                                            <p:strVal val="#ppt_x"/>
+                                          </p:val>
+                                        </p:tav>
+                                      </p:tavLst>
+                                    </p:anim>
+                                    <p:anim calcmode="lin" valueType="num">
+                                      <p:cBhvr additive="base">
+                                        <p:cTn id="32" dur="500" fill="hold"/>
+                                        <p:tgtEl>
+                                          <p:spTgt spid="10"/>
+                                        </p:tgtEl>
+                                        <p:attrNameLst>
+                                          <p:attrName>ppt_y</p:attrName>
+                                        </p:attrNameLst>
+                                      </p:cBhvr>
+                                      <p:tavLst>
+                                        <p:tav tm="0">
+                                          <p:val>
+                                            <p:strVal val="1+#ppt_h/2"/>
+                                          </p:val>
+                                        </p:tav>
+                                        <p:tav tm="100000">
+                                          <p:val>
+                                            <p:strVal val="#ppt_y"/>
+                                          </p:val>
+                                        </p:tav>
+                                      </p:tavLst>
+                                    </p:anim>
+                                  </p:childTnLst>
+                                </p:cTn>
+                              </p:par>
+                            </p:childTnLst>
+                          </p:cTn>
+                        </p:par>
+                      </p:childTnLst>
+                    </p:cTn>
+                  </p:par>
+                </p:childTnLst>
+              </p:cTn>
+              <p:prevCondLst>
+                <p:cond evt="onPrev" delay="0">
+                  <p:tgtEl>
+                    <p:sldTgt/>
+                  </p:tgtEl>
+                </p:cond>
+              </p:prevCondLst>
+              <p:nextCondLst>
+                <p:cond evt="onNext" delay="0">
+                  <p:tgtEl>
+                    <p:sldTgt/>
+                  </p:tgtEl>
+                </p:cond>
+              </p:nextCondLst>
+            </p:seq>
+          </p:childTnLst>
+        </p:cTn>
+      </p:par>
+    </p:tnLst>
+    <p:bldLst>
+      <p:bldP spid="2" grpId="0"/>
+      <p:bldP spid="3" grpId="0" build="p"/>
+    </p:bldLst>
+  </p:timing>
+</p:sld>
+</file>
+
+<file path=ppt/slides/slide6.xml><?xml version="1.0" encoding="utf-8"?>
+<p:sld xmlns:a="http://schemas.openxmlformats.org/drawingml/2006/main" xmlns:r="http://schemas.openxmlformats.org/officeDocument/2006/relationships" xmlns:p="http://schemas.openxmlformats.org/presentationml/2006/main">
+  <p:cSld>
+    <p:spTree>
+      <p:nvGrpSpPr>
+        <p:cNvPr id="1" name=""/>
+        <p:cNvGrpSpPr/>
+        <p:nvPr/>
+      </p:nvGrpSpPr>
+      <p:grpSpPr>
+        <a:xfrm>
+          <a:off x="0" y="0"/>
+          <a:ext cx="0" cy="0"/>
+          <a:chOff x="0" y="0"/>
+          <a:chExt cx="0" cy="0"/>
+        </a:xfrm>
+      </p:grpSpPr>
+      <p:sp>
+        <p:nvSpPr>
+          <p:cNvPr id="2" name="Title 1">
+            <a:extLst>
+              <a:ext uri="{FF2B5EF4-FFF2-40B4-BE49-F238E27FC236}">
+                <a16:creationId xmlns:a16="http://schemas.microsoft.com/office/drawing/2014/main" id="{0CD7F962-C9A6-4384-9485-9F9665A9D752}"/>
+              </a:ext>
+            </a:extLst>
+          </p:cNvPr>
+          <p:cNvSpPr>
+            <a:spLocks noGrp="1"/>
+          </p:cNvSpPr>
+          <p:nvPr>
+            <p:ph type="title"/>
+          </p:nvPr>
+        </p:nvSpPr>
+        <p:spPr/>
+        <p:txBody>
+          <a:bodyPr/>
+          <a:lstStyle/>
+          <a:p>
+            <a:endParaRPr lang="en-US" dirty="0"/>
+          </a:p>
+        </p:txBody>
+      </p:sp>
+      <p:pic>
+        <p:nvPicPr>
+          <p:cNvPr id="5" name="video-1657970076">
+            <a:hlinkClick r:id="" action="ppaction://media"/>
+            <a:extLst>
+              <a:ext uri="{FF2B5EF4-FFF2-40B4-BE49-F238E27FC236}">
+                <a16:creationId xmlns:a16="http://schemas.microsoft.com/office/drawing/2014/main" id="{B8C26810-5F63-4B7D-B501-B0940F3E3A94}"/>
+              </a:ext>
+            </a:extLst>
+          </p:cNvPr>
+          <p:cNvPicPr>
+            <a:picLocks noGrp="1" noChangeAspect="1"/>
+          </p:cNvPicPr>
+          <p:nvPr>
+            <p:ph idx="1"/>
+            <a:videoFile r:link="rId2"/>
+            <p:extLst>
+              <p:ext uri="{DAA4B4D4-6D71-4841-9C94-3DE7FCFB9230}">
+                <p14:media xmlns:p14="http://schemas.microsoft.com/office/powerpoint/2010/main" r:embed="rId1"/>
+              </p:ext>
+            </p:extLst>
+          </p:nvPr>
+        </p:nvPicPr>
+        <p:blipFill>
+          <a:blip r:embed="rId6"/>
+          <a:stretch>
+            <a:fillRect/>
+          </a:stretch>
+        </p:blipFill>
+        <p:spPr>
+          <a:xfrm>
+            <a:off x="0" y="0"/>
+            <a:ext cx="12192000" cy="6858000"/>
+          </a:xfrm>
+          <a:prstGeom prst="rect">
+            <a:avLst/>
+          </a:prstGeom>
+          <a:ln>
+            <a:noFill/>
+          </a:ln>
+          <a:effectLst>
+            <a:outerShdw blurRad="190500" algn="tl" rotWithShape="0">
+              <a:srgbClr val="000000">
+                <a:alpha val="70000"/>
+              </a:srgbClr>
+            </a:outerShdw>
+          </a:effectLst>
+        </p:spPr>
+      </p:pic>
+      <p:pic>
+        <p:nvPicPr>
+          <p:cNvPr id="6" name="video-1657970066">
+            <a:hlinkClick r:id="" action="ppaction://media"/>
+            <a:extLst>
+              <a:ext uri="{FF2B5EF4-FFF2-40B4-BE49-F238E27FC236}">
+                <a16:creationId xmlns:a16="http://schemas.microsoft.com/office/drawing/2014/main" id="{3E3D984A-8518-4328-A9F1-3EA5D0D81AAA}"/>
+              </a:ext>
+            </a:extLst>
+          </p:cNvPr>
+          <p:cNvPicPr>
+            <a:picLocks noChangeAspect="1"/>
+          </p:cNvPicPr>
+          <p:nvPr>
+            <a:videoFile r:link="rId4"/>
+            <p:extLst>
+              <p:ext uri="{DAA4B4D4-6D71-4841-9C94-3DE7FCFB9230}">
+                <p14:media xmlns:p14="http://schemas.microsoft.com/office/powerpoint/2010/main" r:embed="rId3"/>
+              </p:ext>
+            </p:extLst>
+          </p:nvPr>
+        </p:nvPicPr>
+        <p:blipFill>
+          <a:blip r:embed="rId7"/>
+          <a:stretch>
+            <a:fillRect/>
+          </a:stretch>
+        </p:blipFill>
+        <p:spPr>
+          <a:xfrm>
+            <a:off x="0" y="-1"/>
+            <a:ext cx="12192000" cy="6857999"/>
+          </a:xfrm>
+          <a:prstGeom prst="rect">
+            <a:avLst/>
+          </a:prstGeom>
+        </p:spPr>
+      </p:pic>
+    </p:spTree>
+    <p:extLst>
+      <p:ext uri="{BB962C8B-B14F-4D97-AF65-F5344CB8AC3E}">
+        <p14:creationId xmlns:p14="http://schemas.microsoft.com/office/powerpoint/2010/main" val="1123677240"/>
+      </p:ext>
+    </p:extLst>
+  </p:cSld>
+  <p:clrMapOvr>
+    <a:masterClrMapping/>
+  </p:clrMapOvr>
+  <p:timing>
+    <p:tnLst>
+      <p:par>
+        <p:cTn id="1" dur="indefinite" restart="never" nodeType="tmRoot">
+          <p:childTnLst>
+            <p:seq concurrent="1" nextAc="seek">
+              <p:cTn id="2" dur="indefinite" nodeType="mainSeq">
+                <p:childTnLst>
+                  <p:par>
+                    <p:cTn id="3" fill="hold">
+                      <p:stCondLst>
+                        <p:cond delay="indefinite"/>
+                      </p:stCondLst>
+                      <p:childTnLst>
+                        <p:par>
+                          <p:cTn id="4" fill="hold">
+                            <p:stCondLst>
+                              <p:cond delay="0"/>
+                            </p:stCondLst>
+                            <p:childTnLst>
+                              <p:par>
+                                <p:cTn id="5" presetID="2" presetClass="entr" presetSubtype="4" fill="hold" nodeType="clickEffect">
+                                  <p:stCondLst>
+                                    <p:cond delay="0"/>
+                                  </p:stCondLst>
+                                  <p:childTnLst>
+                                    <p:set>
+                                      <p:cBhvr>
+                                        <p:cTn id="6" dur="1" fill="hold">
+                                          <p:stCondLst>
+                                            <p:cond delay="0"/>
+                                          </p:stCondLst>
+                                        </p:cTn>
+                                        <p:tgtEl>
+                                          <p:spTgt spid="5"/>
+                                        </p:tgtEl>
+                                        <p:attrNameLst>
+                                          <p:attrName>style.visibility</p:attrName>
+                                        </p:attrNameLst>
+                                      </p:cBhvr>
+                                      <p:to>
+                                        <p:strVal val="visible"/>
+                                      </p:to>
+                                    </p:set>
+                                    <p:anim calcmode="lin" valueType="num">
+                                      <p:cBhvr additive="base">
+                                        <p:cTn id="7" dur="500" fill="hold"/>
+                                        <p:tgtEl>
+                                          <p:spTgt spid="5"/>
+                                        </p:tgtEl>
+                                        <p:attrNameLst>
+                                          <p:attrName>ppt_x</p:attrName>
+                                        </p:attrNameLst>
+                                      </p:cBhvr>
+                                      <p:tavLst>
+                                        <p:tav tm="0">
+                                          <p:val>
+                                            <p:strVal val="#ppt_x"/>
+                                          </p:val>
+                                        </p:tav>
+                                        <p:tav tm="100000">
+                                          <p:val>
+                                            <p:strVal val="#ppt_x"/>
+                                          </p:val>
+                                        </p:tav>
+                                      </p:tavLst>
+                                    </p:anim>
+                                    <p:anim calcmode="lin" valueType="num">
+                                      <p:cBhvr additive="base">
+                                        <p:cTn id="8" dur="500" fill="hold"/>
+                                        <p:tgtEl>
+                                          <p:spTgt spid="5"/>
+                                        </p:tgtEl>
+                                        <p:attrNameLst>
+                                          <p:attrName>ppt_y</p:attrName>
+                                        </p:attrNameLst>
+                                      </p:cBhvr>
+                                      <p:tavLst>
+                                        <p:tav tm="0">
+                                          <p:val>
+                                            <p:strVal val="1+#ppt_h/2"/>
+                                          </p:val>
+                                        </p:tav>
+                                        <p:tav tm="100000">
+                                          <p:val>
+                                            <p:strVal val="#ppt_y"/>
+                                          </p:val>
+                                        </p:tav>
+                                      </p:tavLst>
+                                    </p:anim>
+                                  </p:childTnLst>
+                                </p:cTn>
+                              </p:par>
+                            </p:childTnLst>
+                          </p:cTn>
+                        </p:par>
+                      </p:childTnLst>
+                    </p:cTn>
+                  </p:par>
+                  <p:par>
+                    <p:cTn id="9" fill="hold">
+                      <p:stCondLst>
+                        <p:cond delay="indefinite"/>
+                      </p:stCondLst>
+                      <p:childTnLst>
+                        <p:par>
+                          <p:cTn id="10" fill="hold">
+                            <p:stCondLst>
+                              <p:cond delay="0"/>
+                            </p:stCondLst>
+                            <p:childTnLst>
+                              <p:par>
+                                <p:cTn id="11" presetID="2" presetClass="entr" presetSubtype="4" fill="hold" nodeType="clickEffect">
+                                  <p:stCondLst>
+                                    <p:cond delay="0"/>
+                                  </p:stCondLst>
+                                  <p:childTnLst>
+                                    <p:set>
+                                      <p:cBhvr>
+                                        <p:cTn id="12" dur="1" fill="hold">
+                                          <p:stCondLst>
+                                            <p:cond delay="0"/>
+                                          </p:stCondLst>
+                                        </p:cTn>
+                                        <p:tgtEl>
+                                          <p:spTgt spid="6"/>
+                                        </p:tgtEl>
+                                        <p:attrNameLst>
+                                          <p:attrName>style.visibility</p:attrName>
+                                        </p:attrNameLst>
+                                      </p:cBhvr>
+                                      <p:to>
+                                        <p:strVal val="visible"/>
+                                      </p:to>
+                                    </p:set>
+                                    <p:anim calcmode="lin" valueType="num">
+                                      <p:cBhvr additive="base">
+                                        <p:cTn id="13" dur="500" fill="hold"/>
+                                        <p:tgtEl>
+                                          <p:spTgt spid="6"/>
+                                        </p:tgtEl>
+                                        <p:attrNameLst>
+                                          <p:attrName>ppt_x</p:attrName>
+                                        </p:attrNameLst>
+                                      </p:cBhvr>
+                                      <p:tavLst>
+                                        <p:tav tm="0">
+                                          <p:val>
+                                            <p:strVal val="#ppt_x"/>
+                                          </p:val>
+                                        </p:tav>
+                                        <p:tav tm="100000">
+                                          <p:val>
+                                            <p:strVal val="#ppt_x"/>
+                                          </p:val>
+                                        </p:tav>
+                                      </p:tavLst>
+                                    </p:anim>
+                                    <p:anim calcmode="lin" valueType="num">
+                                      <p:cBhvr additive="base">
+                                        <p:cTn id="14" dur="500" fill="hold"/>
+                                        <p:tgtEl>
+                                          <p:spTgt spid="6"/>
+                                        </p:tgtEl>
+                                        <p:attrNameLst>
+                                          <p:attrName>ppt_y</p:attrName>
+                                        </p:attrNameLst>
+                                      </p:cBhvr>
+                                      <p:tavLst>
+                                        <p:tav tm="0">
+                                          <p:val>
+                                            <p:strVal val="1+#ppt_h/2"/>
+                                          </p:val>
+                                        </p:tav>
+                                        <p:tav tm="100000">
+                                          <p:val>
+                                            <p:strVal val="#ppt_y"/>
+                                          </p:val>
+                                        </p:tav>
+                                      </p:tavLst>
+                                    </p:anim>
+                                  </p:childTnLst>
+                                </p:cTn>
+                              </p:par>
+                            </p:childTnLst>
+                          </p:cTn>
+                        </p:par>
+                      </p:childTnLst>
+                    </p:cTn>
+                  </p:par>
+                </p:childTnLst>
+              </p:cTn>
+              <p:prevCondLst>
+                <p:cond evt="onPrev" delay="0">
+                  <p:tgtEl>
+                    <p:sldTgt/>
+                  </p:tgtEl>
+                </p:cond>
+              </p:prevCondLst>
+              <p:nextCondLst>
+                <p:cond evt="onNext" delay="0">
+                  <p:tgtEl>
+                    <p:sldTgt/>
+                  </p:tgtEl>
+                </p:cond>
+              </p:nextCondLst>
+            </p:seq>
+            <p:video>
+              <p:cMediaNode vol="80000">
+                <p:cTn id="15" fill="hold" display="0">
+                  <p:stCondLst>
+                    <p:cond delay="indefinite"/>
+                  </p:stCondLst>
+                </p:cTn>
+                <p:tgtEl>
+                  <p:spTgt spid="5"/>
+                </p:tgtEl>
+              </p:cMediaNode>
+            </p:video>
+            <p:video>
+              <p:cMediaNode vol="80000">
+                <p:cTn id="16" fill="hold" display="0">
+                  <p:stCondLst>
+                    <p:cond delay="indefinite"/>
+                  </p:stCondLst>
+                </p:cTn>
+                <p:tgtEl>
+                  <p:spTgt spid="6"/>
+                </p:tgtEl>
+              </p:cMediaNode>
+            </p:video>
+          </p:childTnLst>
+        </p:cTn>
+      </p:par>
+    </p:tnLst>
+  </p:timing>
+</p:sld>
+</file>
+
+<file path=ppt/slides/slide7.xml><?xml version="1.0" encoding="utf-8"?>
 <p:sld xmlns:a="http://schemas.openxmlformats.org/drawingml/2006/main" xmlns:r="http://schemas.openxmlformats.org/officeDocument/2006/relationships" xmlns:p="http://schemas.openxmlformats.org/presentationml/2006/main">
   <p:cSld>
     <p:spTree>
@@ -6099,7 +9134,7 @@
             </a:r>
             <a:r>
               <a:rPr lang="en-US" sz="4400" b="1" dirty="0" err="1"/>
-              <a:t>lập</a:t>
+              <a:t>công</a:t>
             </a:r>
             <a:r>
               <a:rPr lang="en-US" sz="4400" b="1" dirty="0"/>
@@ -6107,7 +9142,7 @@
             </a:r>
             <a:r>
               <a:rPr lang="en-US" sz="4400" b="1" dirty="0" err="1"/>
-              <a:t>trình</a:t>
+              <a:t>việc</a:t>
             </a:r>
             <a:r>
               <a:rPr lang="en-US" sz="4400" b="1" dirty="0"/>
@@ -7798,7 +10833,7 @@
 </p:sld>
 </file>
 
-<file path=ppt/slides/slide5.xml><?xml version="1.0" encoding="utf-8"?>
+<file path=ppt/slides/slide8.xml><?xml version="1.0" encoding="utf-8"?>
 <p:sld xmlns:a="http://schemas.openxmlformats.org/drawingml/2006/main" xmlns:r="http://schemas.openxmlformats.org/officeDocument/2006/relationships" xmlns:p="http://schemas.openxmlformats.org/presentationml/2006/main">
   <p:cSld>
     <p:spTree>
@@ -8858,7 +11893,7 @@
 </p:sld>
 </file>
 
-<file path=ppt/slides/slide6.xml><?xml version="1.0" encoding="utf-8"?>
+<file path=ppt/slides/slide9.xml><?xml version="1.0" encoding="utf-8"?>
 <p:sld xmlns:a="http://schemas.openxmlformats.org/drawingml/2006/main" xmlns:r="http://schemas.openxmlformats.org/officeDocument/2006/relationships" xmlns:p="http://schemas.openxmlformats.org/presentationml/2006/main">
   <p:cSld>
     <p:spTree>
@@ -9829,448 +12864,6 @@
     <p:bldLst>
       <p:bldP spid="2" grpId="0"/>
       <p:bldP spid="3" grpId="0" build="p"/>
-    </p:bldLst>
-  </p:timing>
-</p:sld>
-</file>
-
-<file path=ppt/slides/slide7.xml><?xml version="1.0" encoding="utf-8"?>
-<p:sld xmlns:a="http://schemas.openxmlformats.org/drawingml/2006/main" xmlns:r="http://schemas.openxmlformats.org/officeDocument/2006/relationships" xmlns:p="http://schemas.openxmlformats.org/presentationml/2006/main">
-  <p:cSld>
-    <p:spTree>
-      <p:nvGrpSpPr>
-        <p:cNvPr id="1" name=""/>
-        <p:cNvGrpSpPr/>
-        <p:nvPr/>
-      </p:nvGrpSpPr>
-      <p:grpSpPr>
-        <a:xfrm>
-          <a:off x="0" y="0"/>
-          <a:ext cx="0" cy="0"/>
-          <a:chOff x="0" y="0"/>
-          <a:chExt cx="0" cy="0"/>
-        </a:xfrm>
-      </p:grpSpPr>
-      <p:sp>
-        <p:nvSpPr>
-          <p:cNvPr id="2" name="Title 1">
-            <a:extLst>
-              <a:ext uri="{FF2B5EF4-FFF2-40B4-BE49-F238E27FC236}">
-                <a16:creationId xmlns:a16="http://schemas.microsoft.com/office/drawing/2014/main" id="{77D7518B-6CBF-4377-A9B8-906CF2D05231}"/>
-              </a:ext>
-            </a:extLst>
-          </p:cNvPr>
-          <p:cNvSpPr>
-            <a:spLocks noGrp="1"/>
-          </p:cNvSpPr>
-          <p:nvPr>
-            <p:ph type="title"/>
-          </p:nvPr>
-        </p:nvSpPr>
-        <p:spPr/>
-        <p:txBody>
-          <a:bodyPr>
-            <a:normAutofit fontScale="90000"/>
-          </a:bodyPr>
-          <a:lstStyle/>
-          <a:p>
-            <a:pPr algn="ctr"/>
-            <a:r>
-              <a:rPr lang="en-US" dirty="0" err="1"/>
-              <a:t>Cảm</a:t>
-            </a:r>
-            <a:r>
-              <a:rPr lang="en-US" dirty="0"/>
-              <a:t> </a:t>
-            </a:r>
-            <a:r>
-              <a:rPr lang="vi-VN" dirty="0"/>
-              <a:t>ơ</a:t>
-            </a:r>
-            <a:r>
-              <a:rPr lang="en-US" dirty="0"/>
-              <a:t>n </a:t>
-            </a:r>
-            <a:r>
-              <a:rPr lang="en-US" dirty="0" err="1"/>
-              <a:t>thầy</a:t>
-            </a:r>
-            <a:r>
-              <a:rPr lang="en-US" dirty="0"/>
-              <a:t>/</a:t>
-            </a:r>
-            <a:r>
-              <a:rPr lang="en-US" dirty="0" err="1"/>
-              <a:t>anh</a:t>
-            </a:r>
-            <a:r>
-              <a:rPr lang="en-US" dirty="0"/>
-              <a:t>/</a:t>
-            </a:r>
-            <a:r>
-              <a:rPr lang="en-US" dirty="0" err="1"/>
-              <a:t>chị</a:t>
-            </a:r>
-            <a:r>
-              <a:rPr lang="en-US" dirty="0"/>
-              <a:t>/</a:t>
-            </a:r>
-            <a:r>
-              <a:rPr lang="en-US" dirty="0" err="1"/>
-              <a:t>em</a:t>
-            </a:r>
-            <a:r>
-              <a:rPr lang="en-US" dirty="0"/>
-              <a:t>/</a:t>
-            </a:r>
-            <a:r>
-              <a:rPr lang="en-US" dirty="0" err="1"/>
-              <a:t>bạn</a:t>
-            </a:r>
-            <a:r>
-              <a:rPr lang="en-US" dirty="0"/>
-              <a:t> </a:t>
-            </a:r>
-            <a:r>
-              <a:rPr lang="en-US" dirty="0" err="1"/>
-              <a:t>đã</a:t>
-            </a:r>
-            <a:r>
-              <a:rPr lang="en-US" dirty="0"/>
-              <a:t> </a:t>
-            </a:r>
-            <a:r>
-              <a:rPr lang="en-US" dirty="0" err="1"/>
-              <a:t>có</a:t>
-            </a:r>
-            <a:r>
-              <a:rPr lang="en-US" dirty="0"/>
-              <a:t> </a:t>
-            </a:r>
-            <a:r>
-              <a:rPr lang="en-US" dirty="0" err="1"/>
-              <a:t>mặt</a:t>
-            </a:r>
-            <a:r>
-              <a:rPr lang="en-US" dirty="0"/>
-              <a:t> </a:t>
-            </a:r>
-            <a:r>
-              <a:rPr lang="en-US" dirty="0" err="1"/>
-              <a:t>và</a:t>
-            </a:r>
-            <a:r>
-              <a:rPr lang="en-US" dirty="0"/>
-              <a:t> </a:t>
-            </a:r>
-            <a:r>
-              <a:rPr lang="en-US" dirty="0" err="1"/>
-              <a:t>lắng</a:t>
-            </a:r>
-            <a:r>
-              <a:rPr lang="en-US" dirty="0"/>
-              <a:t> </a:t>
-            </a:r>
-            <a:r>
-              <a:rPr lang="en-US" dirty="0" err="1"/>
-              <a:t>nge</a:t>
-            </a:r>
-            <a:r>
-              <a:rPr lang="en-US" dirty="0"/>
-              <a:t> </a:t>
-            </a:r>
-            <a:r>
-              <a:rPr lang="en-US" dirty="0" err="1"/>
-              <a:t>buổi</a:t>
-            </a:r>
-            <a:r>
-              <a:rPr lang="en-US" dirty="0"/>
-              <a:t> </a:t>
-            </a:r>
-            <a:r>
-              <a:rPr lang="en-US" dirty="0" err="1"/>
-              <a:t>thuyết</a:t>
-            </a:r>
-            <a:r>
-              <a:rPr lang="en-US" dirty="0"/>
-              <a:t> </a:t>
-            </a:r>
-            <a:r>
-              <a:rPr lang="en-US" dirty="0" err="1"/>
-              <a:t>trình</a:t>
-            </a:r>
-            <a:r>
-              <a:rPr lang="en-US" dirty="0"/>
-              <a:t> !</a:t>
-            </a:r>
-            <a:br>
-              <a:rPr lang="en-US" dirty="0"/>
-            </a:br>
-            <a:endParaRPr lang="en-US" dirty="0"/>
-          </a:p>
-        </p:txBody>
-      </p:sp>
-      <p:pic>
-        <p:nvPicPr>
-          <p:cNvPr id="5" name="Content Placeholder 4">
-            <a:extLst>
-              <a:ext uri="{FF2B5EF4-FFF2-40B4-BE49-F238E27FC236}">
-                <a16:creationId xmlns:a16="http://schemas.microsoft.com/office/drawing/2014/main" id="{6BC55331-E964-4B96-928A-5CA2B4F4B5E0}"/>
-              </a:ext>
-            </a:extLst>
-          </p:cNvPr>
-          <p:cNvPicPr>
-            <a:picLocks noGrp="1" noChangeAspect="1"/>
-          </p:cNvPicPr>
-          <p:nvPr>
-            <p:ph idx="1"/>
-          </p:nvPr>
-        </p:nvPicPr>
-        <p:blipFill>
-          <a:blip r:embed="rId2">
-            <a:extLst>
-              <a:ext uri="{28A0092B-C50C-407E-A947-70E740481C1C}">
-                <a14:useLocalDpi xmlns:a14="http://schemas.microsoft.com/office/drawing/2010/main" val="0"/>
-              </a:ext>
-            </a:extLst>
-          </a:blip>
-          <a:stretch>
-            <a:fillRect/>
-          </a:stretch>
-        </p:blipFill>
-        <p:spPr>
-          <a:xfrm>
-            <a:off x="381741" y="1340528"/>
-            <a:ext cx="10972060" cy="4836435"/>
-          </a:xfrm>
-          <a:effectLst>
-            <a:softEdge rad="317500"/>
-          </a:effectLst>
-        </p:spPr>
-      </p:pic>
-    </p:spTree>
-    <p:extLst>
-      <p:ext uri="{BB962C8B-B14F-4D97-AF65-F5344CB8AC3E}">
-        <p14:creationId xmlns:p14="http://schemas.microsoft.com/office/powerpoint/2010/main" val="3219712349"/>
-      </p:ext>
-    </p:extLst>
-  </p:cSld>
-  <p:clrMapOvr>
-    <a:masterClrMapping/>
-  </p:clrMapOvr>
-  <p:timing>
-    <p:tnLst>
-      <p:par>
-        <p:cTn id="1" dur="indefinite" restart="never" nodeType="tmRoot">
-          <p:childTnLst>
-            <p:seq concurrent="1" nextAc="seek">
-              <p:cTn id="2" dur="indefinite" nodeType="mainSeq">
-                <p:childTnLst>
-                  <p:par>
-                    <p:cTn id="3" fill="hold">
-                      <p:stCondLst>
-                        <p:cond delay="indefinite"/>
-                      </p:stCondLst>
-                      <p:childTnLst>
-                        <p:par>
-                          <p:cTn id="4" fill="hold">
-                            <p:stCondLst>
-                              <p:cond delay="0"/>
-                            </p:stCondLst>
-                            <p:childTnLst>
-                              <p:par>
-                                <p:cTn id="5" presetID="2" presetClass="entr" presetSubtype="4" fill="hold" grpId="0" nodeType="clickEffect">
-                                  <p:stCondLst>
-                                    <p:cond delay="0"/>
-                                  </p:stCondLst>
-                                  <p:childTnLst>
-                                    <p:set>
-                                      <p:cBhvr>
-                                        <p:cTn id="6" dur="1" fill="hold">
-                                          <p:stCondLst>
-                                            <p:cond delay="0"/>
-                                          </p:stCondLst>
-                                        </p:cTn>
-                                        <p:tgtEl>
-                                          <p:spTgt spid="2"/>
-                                        </p:tgtEl>
-                                        <p:attrNameLst>
-                                          <p:attrName>style.visibility</p:attrName>
-                                        </p:attrNameLst>
-                                      </p:cBhvr>
-                                      <p:to>
-                                        <p:strVal val="visible"/>
-                                      </p:to>
-                                    </p:set>
-                                    <p:anim calcmode="lin" valueType="num">
-                                      <p:cBhvr additive="base">
-                                        <p:cTn id="7" dur="500" fill="hold"/>
-                                        <p:tgtEl>
-                                          <p:spTgt spid="2"/>
-                                        </p:tgtEl>
-                                        <p:attrNameLst>
-                                          <p:attrName>ppt_x</p:attrName>
-                                        </p:attrNameLst>
-                                      </p:cBhvr>
-                                      <p:tavLst>
-                                        <p:tav tm="0">
-                                          <p:val>
-                                            <p:strVal val="#ppt_x"/>
-                                          </p:val>
-                                        </p:tav>
-                                        <p:tav tm="100000">
-                                          <p:val>
-                                            <p:strVal val="#ppt_x"/>
-                                          </p:val>
-                                        </p:tav>
-                                      </p:tavLst>
-                                    </p:anim>
-                                    <p:anim calcmode="lin" valueType="num">
-                                      <p:cBhvr additive="base">
-                                        <p:cTn id="8" dur="500" fill="hold"/>
-                                        <p:tgtEl>
-                                          <p:spTgt spid="2"/>
-                                        </p:tgtEl>
-                                        <p:attrNameLst>
-                                          <p:attrName>ppt_y</p:attrName>
-                                        </p:attrNameLst>
-                                      </p:cBhvr>
-                                      <p:tavLst>
-                                        <p:tav tm="0">
-                                          <p:val>
-                                            <p:strVal val="1+#ppt_h/2"/>
-                                          </p:val>
-                                        </p:tav>
-                                        <p:tav tm="100000">
-                                          <p:val>
-                                            <p:strVal val="#ppt_y"/>
-                                          </p:val>
-                                        </p:tav>
-                                      </p:tavLst>
-                                    </p:anim>
-                                  </p:childTnLst>
-                                </p:cTn>
-                              </p:par>
-                            </p:childTnLst>
-                          </p:cTn>
-                        </p:par>
-                      </p:childTnLst>
-                    </p:cTn>
-                  </p:par>
-                  <p:par>
-                    <p:cTn id="9" fill="hold">
-                      <p:stCondLst>
-                        <p:cond delay="indefinite"/>
-                      </p:stCondLst>
-                      <p:childTnLst>
-                        <p:par>
-                          <p:cTn id="10" fill="hold">
-                            <p:stCondLst>
-                              <p:cond delay="0"/>
-                            </p:stCondLst>
-                            <p:childTnLst>
-                              <p:par>
-                                <p:cTn id="11" presetID="2" presetClass="entr" presetSubtype="4" fill="hold" nodeType="clickEffect">
-                                  <p:stCondLst>
-                                    <p:cond delay="0"/>
-                                  </p:stCondLst>
-                                  <p:childTnLst>
-                                    <p:set>
-                                      <p:cBhvr>
-                                        <p:cTn id="12" dur="1" fill="hold">
-                                          <p:stCondLst>
-                                            <p:cond delay="0"/>
-                                          </p:stCondLst>
-                                        </p:cTn>
-                                        <p:tgtEl>
-                                          <p:spTgt spid="5"/>
-                                        </p:tgtEl>
-                                        <p:attrNameLst>
-                                          <p:attrName>style.visibility</p:attrName>
-                                        </p:attrNameLst>
-                                      </p:cBhvr>
-                                      <p:to>
-                                        <p:strVal val="visible"/>
-                                      </p:to>
-                                    </p:set>
-                                    <p:anim calcmode="lin" valueType="num">
-                                      <p:cBhvr additive="base">
-                                        <p:cTn id="13" dur="500" fill="hold"/>
-                                        <p:tgtEl>
-                                          <p:spTgt spid="5"/>
-                                        </p:tgtEl>
-                                        <p:attrNameLst>
-                                          <p:attrName>ppt_x</p:attrName>
-                                        </p:attrNameLst>
-                                      </p:cBhvr>
-                                      <p:tavLst>
-                                        <p:tav tm="0">
-                                          <p:val>
-                                            <p:strVal val="#ppt_x"/>
-                                          </p:val>
-                                        </p:tav>
-                                        <p:tav tm="100000">
-                                          <p:val>
-                                            <p:strVal val="#ppt_x"/>
-                                          </p:val>
-                                        </p:tav>
-                                      </p:tavLst>
-                                    </p:anim>
-                                    <p:anim calcmode="lin" valueType="num">
-                                      <p:cBhvr additive="base">
-                                        <p:cTn id="14" dur="500" fill="hold"/>
-                                        <p:tgtEl>
-                                          <p:spTgt spid="5"/>
-                                        </p:tgtEl>
-                                        <p:attrNameLst>
-                                          <p:attrName>ppt_y</p:attrName>
-                                        </p:attrNameLst>
-                                      </p:cBhvr>
-                                      <p:tavLst>
-                                        <p:tav tm="0">
-                                          <p:val>
-                                            <p:strVal val="1+#ppt_h/2"/>
-                                          </p:val>
-                                        </p:tav>
-                                        <p:tav tm="100000">
-                                          <p:val>
-                                            <p:strVal val="#ppt_y"/>
-                                          </p:val>
-                                        </p:tav>
-                                      </p:tavLst>
-                                    </p:anim>
-                                  </p:childTnLst>
-                                </p:cTn>
-                              </p:par>
-                            </p:childTnLst>
-                          </p:cTn>
-                        </p:par>
-                      </p:childTnLst>
-                    </p:cTn>
-                  </p:par>
-                </p:childTnLst>
-              </p:cTn>
-              <p:prevCondLst>
-                <p:cond evt="onPrev" delay="0">
-                  <p:tgtEl>
-                    <p:sldTgt/>
-                  </p:tgtEl>
-                </p:cond>
-              </p:prevCondLst>
-              <p:nextCondLst>
-                <p:cond evt="onNext" delay="0">
-                  <p:tgtEl>
-                    <p:sldTgt/>
-                  </p:tgtEl>
-                </p:cond>
-              </p:nextCondLst>
-            </p:seq>
-          </p:childTnLst>
-        </p:cTn>
-      </p:par>
-    </p:tnLst>
-    <p:bldLst>
-      <p:bldP spid="2" grpId="0"/>
     </p:bldLst>
   </p:timing>
 </p:sld>

</xml_diff>